<commit_message>
exercises and new pp
</commit_message>
<xml_diff>
--- a/Lessons/Jaar 2/Lesson 3/Lesson 3.pptx
+++ b/Lessons/Jaar 2/Lesson 3/Lesson 3.pptx
@@ -8,7 +8,17 @@
     <p:sldId id="284" r:id="rId2"/>
     <p:sldId id="263" r:id="rId3"/>
     <p:sldId id="287" r:id="rId4"/>
-    <p:sldId id="288" r:id="rId5"/>
+    <p:sldId id="289" r:id="rId5"/>
+    <p:sldId id="290" r:id="rId6"/>
+    <p:sldId id="291" r:id="rId7"/>
+    <p:sldId id="292" r:id="rId8"/>
+    <p:sldId id="293" r:id="rId9"/>
+    <p:sldId id="294" r:id="rId10"/>
+    <p:sldId id="296" r:id="rId11"/>
+    <p:sldId id="295" r:id="rId12"/>
+    <p:sldId id="297" r:id="rId13"/>
+    <p:sldId id="298" r:id="rId14"/>
+    <p:sldId id="288" r:id="rId15"/>
   </p:sldIdLst>
   <p:sldSz cx="12192000" cy="6858000"/>
   <p:notesSz cx="6858000" cy="9144000"/>
@@ -107,6 +117,11 @@
       </a:defRPr>
     </a:lvl9pPr>
   </p:defaultTextStyle>
+  <p:extLst>
+    <p:ext uri="{EFAFB233-063F-42B5-8137-9DF3F51BA10A}">
+      <p15:sldGuideLst xmlns:p15="http://schemas.microsoft.com/office/powerpoint/2012/main"/>
+    </p:ext>
+  </p:extLst>
 </p:presentation>
 </file>
 
@@ -259,7 +274,7 @@
           <a:p>
             <a:fld id="{84F85FDE-986E-4551-989E-09F8C4D6AE8F}" type="datetimeFigureOut">
               <a:rPr lang="en-US" smtClean="0"/>
-              <a:t>10/16/2019</a:t>
+              <a:t>12/10/2019</a:t>
             </a:fld>
             <a:endParaRPr lang="en-US"/>
           </a:p>
@@ -459,7 +474,7 @@
           <a:p>
             <a:fld id="{84F85FDE-986E-4551-989E-09F8C4D6AE8F}" type="datetimeFigureOut">
               <a:rPr lang="en-US" smtClean="0"/>
-              <a:t>10/16/2019</a:t>
+              <a:t>12/10/2019</a:t>
             </a:fld>
             <a:endParaRPr lang="en-US"/>
           </a:p>
@@ -669,7 +684,7 @@
           <a:p>
             <a:fld id="{84F85FDE-986E-4551-989E-09F8C4D6AE8F}" type="datetimeFigureOut">
               <a:rPr lang="en-US" smtClean="0"/>
-              <a:t>10/16/2019</a:t>
+              <a:t>12/10/2019</a:t>
             </a:fld>
             <a:endParaRPr lang="en-US"/>
           </a:p>
@@ -1031,7 +1046,7 @@
           <a:p>
             <a:fld id="{84F85FDE-986E-4551-989E-09F8C4D6AE8F}" type="datetimeFigureOut">
               <a:rPr lang="en-US" smtClean="0"/>
-              <a:t>10/16/2019</a:t>
+              <a:t>12/10/2019</a:t>
             </a:fld>
             <a:endParaRPr lang="en-US"/>
           </a:p>
@@ -1307,7 +1322,7 @@
           <a:p>
             <a:fld id="{84F85FDE-986E-4551-989E-09F8C4D6AE8F}" type="datetimeFigureOut">
               <a:rPr lang="en-US" smtClean="0"/>
-              <a:t>10/16/2019</a:t>
+              <a:t>12/10/2019</a:t>
             </a:fld>
             <a:endParaRPr lang="en-US"/>
           </a:p>
@@ -1575,7 +1590,7 @@
           <a:p>
             <a:fld id="{84F85FDE-986E-4551-989E-09F8C4D6AE8F}" type="datetimeFigureOut">
               <a:rPr lang="en-US" smtClean="0"/>
-              <a:t>10/16/2019</a:t>
+              <a:t>12/10/2019</a:t>
             </a:fld>
             <a:endParaRPr lang="en-US"/>
           </a:p>
@@ -1990,7 +2005,7 @@
           <a:p>
             <a:fld id="{84F85FDE-986E-4551-989E-09F8C4D6AE8F}" type="datetimeFigureOut">
               <a:rPr lang="en-US" smtClean="0"/>
-              <a:t>10/16/2019</a:t>
+              <a:t>12/10/2019</a:t>
             </a:fld>
             <a:endParaRPr lang="en-US"/>
           </a:p>
@@ -2132,7 +2147,7 @@
           <a:p>
             <a:fld id="{84F85FDE-986E-4551-989E-09F8C4D6AE8F}" type="datetimeFigureOut">
               <a:rPr lang="en-US" smtClean="0"/>
-              <a:t>10/16/2019</a:t>
+              <a:t>12/10/2019</a:t>
             </a:fld>
             <a:endParaRPr lang="en-US"/>
           </a:p>
@@ -2245,7 +2260,7 @@
           <a:p>
             <a:fld id="{84F85FDE-986E-4551-989E-09F8C4D6AE8F}" type="datetimeFigureOut">
               <a:rPr lang="en-US" smtClean="0"/>
-              <a:t>10/16/2019</a:t>
+              <a:t>12/10/2019</a:t>
             </a:fld>
             <a:endParaRPr lang="en-US"/>
           </a:p>
@@ -2558,7 +2573,7 @@
           <a:p>
             <a:fld id="{84F85FDE-986E-4551-989E-09F8C4D6AE8F}" type="datetimeFigureOut">
               <a:rPr lang="en-US" smtClean="0"/>
-              <a:t>10/16/2019</a:t>
+              <a:t>12/10/2019</a:t>
             </a:fld>
             <a:endParaRPr lang="en-US"/>
           </a:p>
@@ -2847,7 +2862,7 @@
           <a:p>
             <a:fld id="{84F85FDE-986E-4551-989E-09F8C4D6AE8F}" type="datetimeFigureOut">
               <a:rPr lang="en-US" smtClean="0"/>
-              <a:t>10/16/2019</a:t>
+              <a:t>12/10/2019</a:t>
             </a:fld>
             <a:endParaRPr lang="en-US"/>
           </a:p>
@@ -3090,7 +3105,7 @@
           <a:p>
             <a:fld id="{84F85FDE-986E-4551-989E-09F8C4D6AE8F}" type="datetimeFigureOut">
               <a:rPr lang="en-US" smtClean="0"/>
-              <a:t>10/16/2019</a:t>
+              <a:t>12/10/2019</a:t>
             </a:fld>
             <a:endParaRPr lang="en-US"/>
           </a:p>
@@ -3559,7 +3574,7 @@
               <a:rPr lang="nl-NL" sz="5400" dirty="0" err="1">
                 <a:latin typeface="+mj-lt"/>
               </a:rPr>
-              <a:t>Title</a:t>
+              <a:t>Functions</a:t>
             </a:r>
             <a:endParaRPr lang="nl-NL" sz="5400" dirty="0">
               <a:latin typeface="+mj-lt"/>
@@ -3627,7 +3642,389 @@
 </p:sld>
 </file>
 
-<file path=ppt/slides/slide2.xml><?xml version="1.0" encoding="utf-8"?>
+<file path=ppt/slides/slide10.xml><?xml version="1.0" encoding="utf-8"?>
+<p:sld xmlns:a="http://schemas.openxmlformats.org/drawingml/2006/main" xmlns:r="http://schemas.openxmlformats.org/officeDocument/2006/relationships" xmlns:p="http://schemas.openxmlformats.org/presentationml/2006/main">
+  <p:cSld>
+    <p:spTree>
+      <p:nvGrpSpPr>
+        <p:cNvPr id="1" name=""/>
+        <p:cNvGrpSpPr/>
+        <p:nvPr/>
+      </p:nvGrpSpPr>
+      <p:grpSpPr>
+        <a:xfrm>
+          <a:off x="0" y="0"/>
+          <a:ext cx="0" cy="0"/>
+          <a:chOff x="0" y="0"/>
+          <a:chExt cx="0" cy="0"/>
+        </a:xfrm>
+      </p:grpSpPr>
+      <p:sp>
+        <p:nvSpPr>
+          <p:cNvPr id="4" name="Titel 1">
+            <a:extLst>
+              <a:ext uri="{FF2B5EF4-FFF2-40B4-BE49-F238E27FC236}">
+                <a16:creationId xmlns:a16="http://schemas.microsoft.com/office/drawing/2014/main" id="{53F2A67E-F5CD-4C11-A923-966E9932A6D9}"/>
+              </a:ext>
+            </a:extLst>
+          </p:cNvPr>
+          <p:cNvSpPr>
+            <a:spLocks noGrp="1"/>
+          </p:cNvSpPr>
+          <p:nvPr>
+            <p:ph type="title"/>
+          </p:nvPr>
+        </p:nvSpPr>
+        <p:spPr>
+          <a:xfrm>
+            <a:off x="838200" y="365125"/>
+            <a:ext cx="10515600" cy="1325563"/>
+          </a:xfrm>
+        </p:spPr>
+        <p:txBody>
+          <a:bodyPr/>
+          <a:lstStyle/>
+          <a:p>
+            <a:r>
+              <a:rPr lang="en-US" dirty="0">
+                <a:latin typeface="+mj-lt"/>
+              </a:rPr>
+              <a:t>Result</a:t>
+            </a:r>
+          </a:p>
+        </p:txBody>
+      </p:sp>
+      <p:pic>
+        <p:nvPicPr>
+          <p:cNvPr id="3074" name="Picture 2" descr="https://i.gyazo.com/bfbb90574d649e492d27fe64e9ecca0c.png">
+            <a:extLst>
+              <a:ext uri="{FF2B5EF4-FFF2-40B4-BE49-F238E27FC236}">
+                <a16:creationId xmlns:a16="http://schemas.microsoft.com/office/drawing/2014/main" id="{4FDEB867-6979-4AD6-9015-297BFF8468FB}"/>
+              </a:ext>
+            </a:extLst>
+          </p:cNvPr>
+          <p:cNvPicPr>
+            <a:picLocks noChangeAspect="1" noChangeArrowheads="1"/>
+          </p:cNvPicPr>
+          <p:nvPr/>
+        </p:nvPicPr>
+        <p:blipFill>
+          <a:blip r:embed="rId2">
+            <a:extLst>
+              <a:ext uri="{28A0092B-C50C-407E-A947-70E740481C1C}">
+                <a14:useLocalDpi xmlns:a14="http://schemas.microsoft.com/office/drawing/2010/main" val="0"/>
+              </a:ext>
+            </a:extLst>
+          </a:blip>
+          <a:srcRect/>
+          <a:stretch>
+            <a:fillRect/>
+          </a:stretch>
+        </p:blipFill>
+        <p:spPr bwMode="auto">
+          <a:xfrm>
+            <a:off x="2890837" y="1266825"/>
+            <a:ext cx="6410325" cy="4324350"/>
+          </a:xfrm>
+          <a:prstGeom prst="rect">
+            <a:avLst/>
+          </a:prstGeom>
+          <a:noFill/>
+          <a:extLst>
+            <a:ext uri="{909E8E84-426E-40DD-AFC4-6F175D3DCCD1}">
+              <a14:hiddenFill xmlns:a14="http://schemas.microsoft.com/office/drawing/2010/main">
+                <a:solidFill>
+                  <a:srgbClr val="FFFFFF"/>
+                </a:solidFill>
+              </a14:hiddenFill>
+            </a:ext>
+          </a:extLst>
+        </p:spPr>
+      </p:pic>
+    </p:spTree>
+    <p:extLst>
+      <p:ext uri="{BB962C8B-B14F-4D97-AF65-F5344CB8AC3E}">
+        <p14:creationId xmlns:p14="http://schemas.microsoft.com/office/powerpoint/2010/main" val="487472310"/>
+      </p:ext>
+    </p:extLst>
+  </p:cSld>
+  <p:clrMapOvr>
+    <a:masterClrMapping/>
+  </p:clrMapOvr>
+</p:sld>
+</file>
+
+<file path=ppt/slides/slide11.xml><?xml version="1.0" encoding="utf-8"?>
+<p:sld xmlns:a="http://schemas.openxmlformats.org/drawingml/2006/main" xmlns:r="http://schemas.openxmlformats.org/officeDocument/2006/relationships" xmlns:p="http://schemas.openxmlformats.org/presentationml/2006/main">
+  <p:cSld>
+    <p:spTree>
+      <p:nvGrpSpPr>
+        <p:cNvPr id="1" name=""/>
+        <p:cNvGrpSpPr/>
+        <p:nvPr/>
+      </p:nvGrpSpPr>
+      <p:grpSpPr>
+        <a:xfrm>
+          <a:off x="0" y="0"/>
+          <a:ext cx="0" cy="0"/>
+          <a:chOff x="0" y="0"/>
+          <a:chExt cx="0" cy="0"/>
+        </a:xfrm>
+      </p:grpSpPr>
+      <p:sp>
+        <p:nvSpPr>
+          <p:cNvPr id="5" name="Titel 1">
+            <a:extLst>
+              <a:ext uri="{FF2B5EF4-FFF2-40B4-BE49-F238E27FC236}">
+                <a16:creationId xmlns:a16="http://schemas.microsoft.com/office/drawing/2014/main" id="{B77E19A9-3021-448D-AE07-B49B13A0C5DD}"/>
+              </a:ext>
+            </a:extLst>
+          </p:cNvPr>
+          <p:cNvSpPr>
+            <a:spLocks noGrp="1"/>
+          </p:cNvSpPr>
+          <p:nvPr>
+            <p:ph type="title"/>
+          </p:nvPr>
+        </p:nvSpPr>
+        <p:spPr>
+          <a:xfrm>
+            <a:off x="838200" y="365125"/>
+            <a:ext cx="10515600" cy="1325563"/>
+          </a:xfrm>
+        </p:spPr>
+        <p:txBody>
+          <a:bodyPr/>
+          <a:lstStyle/>
+          <a:p>
+            <a:r>
+              <a:rPr lang="en-US" dirty="0">
+                <a:latin typeface="+mj-lt"/>
+              </a:rPr>
+              <a:t>What is unclear?</a:t>
+            </a:r>
+          </a:p>
+        </p:txBody>
+      </p:sp>
+      <p:pic>
+        <p:nvPicPr>
+          <p:cNvPr id="6146" name="Picture 2" descr="Afbeeldingsresultaat voor unclear">
+            <a:extLst>
+              <a:ext uri="{FF2B5EF4-FFF2-40B4-BE49-F238E27FC236}">
+                <a16:creationId xmlns:a16="http://schemas.microsoft.com/office/drawing/2014/main" id="{3F97DFF1-CD14-42B2-AD40-FD592BC1C5A7}"/>
+              </a:ext>
+            </a:extLst>
+          </p:cNvPr>
+          <p:cNvPicPr>
+            <a:picLocks noChangeAspect="1" noChangeArrowheads="1"/>
+          </p:cNvPicPr>
+          <p:nvPr/>
+        </p:nvPicPr>
+        <p:blipFill>
+          <a:blip r:embed="rId2">
+            <a:extLst>
+              <a:ext uri="{28A0092B-C50C-407E-A947-70E740481C1C}">
+                <a14:useLocalDpi xmlns:a14="http://schemas.microsoft.com/office/drawing/2010/main" val="0"/>
+              </a:ext>
+            </a:extLst>
+          </a:blip>
+          <a:srcRect/>
+          <a:stretch>
+            <a:fillRect/>
+          </a:stretch>
+        </p:blipFill>
+        <p:spPr bwMode="auto">
+          <a:xfrm>
+            <a:off x="4976812" y="1616075"/>
+            <a:ext cx="2238375" cy="4876800"/>
+          </a:xfrm>
+          <a:prstGeom prst="rect">
+            <a:avLst/>
+          </a:prstGeom>
+          <a:noFill/>
+          <a:extLst>
+            <a:ext uri="{909E8E84-426E-40DD-AFC4-6F175D3DCCD1}">
+              <a14:hiddenFill xmlns:a14="http://schemas.microsoft.com/office/drawing/2010/main">
+                <a:solidFill>
+                  <a:srgbClr val="FFFFFF"/>
+                </a:solidFill>
+              </a14:hiddenFill>
+            </a:ext>
+          </a:extLst>
+        </p:spPr>
+      </p:pic>
+    </p:spTree>
+    <p:extLst>
+      <p:ext uri="{BB962C8B-B14F-4D97-AF65-F5344CB8AC3E}">
+        <p14:creationId xmlns:p14="http://schemas.microsoft.com/office/powerpoint/2010/main" val="2513776773"/>
+      </p:ext>
+    </p:extLst>
+  </p:cSld>
+  <p:clrMapOvr>
+    <a:masterClrMapping/>
+  </p:clrMapOvr>
+</p:sld>
+</file>
+
+<file path=ppt/slides/slide12.xml><?xml version="1.0" encoding="utf-8"?>
+<p:sld xmlns:a="http://schemas.openxmlformats.org/drawingml/2006/main" xmlns:r="http://schemas.openxmlformats.org/officeDocument/2006/relationships" xmlns:p="http://schemas.openxmlformats.org/presentationml/2006/main">
+  <p:cSld>
+    <p:spTree>
+      <p:nvGrpSpPr>
+        <p:cNvPr id="1" name=""/>
+        <p:cNvGrpSpPr/>
+        <p:nvPr/>
+      </p:nvGrpSpPr>
+      <p:grpSpPr>
+        <a:xfrm>
+          <a:off x="0" y="0"/>
+          <a:ext cx="0" cy="0"/>
+          <a:chOff x="0" y="0"/>
+          <a:chExt cx="0" cy="0"/>
+        </a:xfrm>
+      </p:grpSpPr>
+      <p:sp>
+        <p:nvSpPr>
+          <p:cNvPr id="4" name="Titel 1">
+            <a:extLst>
+              <a:ext uri="{FF2B5EF4-FFF2-40B4-BE49-F238E27FC236}">
+                <a16:creationId xmlns:a16="http://schemas.microsoft.com/office/drawing/2014/main" id="{8C2BEA05-40D9-4B1C-A4F6-0CAFF127BA83}"/>
+              </a:ext>
+            </a:extLst>
+          </p:cNvPr>
+          <p:cNvSpPr>
+            <a:spLocks noGrp="1"/>
+          </p:cNvSpPr>
+          <p:nvPr>
+            <p:ph type="title"/>
+          </p:nvPr>
+        </p:nvSpPr>
+        <p:spPr>
+          <a:xfrm>
+            <a:off x="838200" y="2766218"/>
+            <a:ext cx="10515600" cy="1325563"/>
+          </a:xfrm>
+        </p:spPr>
+        <p:txBody>
+          <a:bodyPr>
+            <a:normAutofit/>
+          </a:bodyPr>
+          <a:lstStyle/>
+          <a:p>
+            <a:r>
+              <a:rPr lang="en-US" sz="4000" dirty="0">
+                <a:latin typeface="+mj-lt"/>
+              </a:rPr>
+              <a:t>What would you want to see in the next lessons?</a:t>
+            </a:r>
+          </a:p>
+        </p:txBody>
+      </p:sp>
+    </p:spTree>
+    <p:extLst>
+      <p:ext uri="{BB962C8B-B14F-4D97-AF65-F5344CB8AC3E}">
+        <p14:creationId xmlns:p14="http://schemas.microsoft.com/office/powerpoint/2010/main" val="2876781796"/>
+      </p:ext>
+    </p:extLst>
+  </p:cSld>
+  <p:clrMapOvr>
+    <a:masterClrMapping/>
+  </p:clrMapOvr>
+</p:sld>
+</file>
+
+<file path=ppt/slides/slide13.xml><?xml version="1.0" encoding="utf-8"?>
+<p:sld xmlns:a="http://schemas.openxmlformats.org/drawingml/2006/main" xmlns:r="http://schemas.openxmlformats.org/officeDocument/2006/relationships" xmlns:p="http://schemas.openxmlformats.org/presentationml/2006/main">
+  <p:cSld>
+    <p:spTree>
+      <p:nvGrpSpPr>
+        <p:cNvPr id="1" name=""/>
+        <p:cNvGrpSpPr/>
+        <p:nvPr/>
+      </p:nvGrpSpPr>
+      <p:grpSpPr>
+        <a:xfrm>
+          <a:off x="0" y="0"/>
+          <a:ext cx="0" cy="0"/>
+          <a:chOff x="0" y="0"/>
+          <a:chExt cx="0" cy="0"/>
+        </a:xfrm>
+      </p:grpSpPr>
+      <p:sp>
+        <p:nvSpPr>
+          <p:cNvPr id="4" name="Tekstvak 3">
+            <a:extLst>
+              <a:ext uri="{FF2B5EF4-FFF2-40B4-BE49-F238E27FC236}">
+                <a16:creationId xmlns:a16="http://schemas.microsoft.com/office/drawing/2014/main" id="{723004F0-9876-46A2-A2CB-10BEB1A4F652}"/>
+              </a:ext>
+            </a:extLst>
+          </p:cNvPr>
+          <p:cNvSpPr txBox="1"/>
+          <p:nvPr/>
+        </p:nvSpPr>
+        <p:spPr>
+          <a:xfrm>
+            <a:off x="2444045" y="2721114"/>
+            <a:ext cx="7303910" cy="707886"/>
+          </a:xfrm>
+          <a:prstGeom prst="rect">
+            <a:avLst/>
+          </a:prstGeom>
+          <a:noFill/>
+        </p:spPr>
+        <p:txBody>
+          <a:bodyPr wrap="square" rtlCol="0">
+            <a:spAutoFit/>
+          </a:bodyPr>
+          <a:lstStyle/>
+          <a:p>
+            <a:r>
+              <a:rPr lang="nl-NL" sz="4000" dirty="0">
+                <a:latin typeface="+mj-lt"/>
+              </a:rPr>
+              <a:t>My </a:t>
+            </a:r>
+            <a:r>
+              <a:rPr lang="nl-NL" sz="4000" dirty="0" err="1">
+                <a:latin typeface="+mj-lt"/>
+              </a:rPr>
+              <a:t>experiences</a:t>
+            </a:r>
+            <a:r>
+              <a:rPr lang="nl-NL" sz="4000" dirty="0">
+                <a:latin typeface="+mj-lt"/>
+              </a:rPr>
+              <a:t> </a:t>
+            </a:r>
+            <a:r>
+              <a:rPr lang="nl-NL" sz="4000" dirty="0" err="1">
+                <a:latin typeface="+mj-lt"/>
+              </a:rPr>
+              <a:t>and</a:t>
+            </a:r>
+            <a:r>
+              <a:rPr lang="nl-NL" sz="4000" dirty="0">
+                <a:latin typeface="+mj-lt"/>
+              </a:rPr>
+              <a:t> expertise?</a:t>
+            </a:r>
+          </a:p>
+        </p:txBody>
+      </p:sp>
+    </p:spTree>
+    <p:extLst>
+      <p:ext uri="{BB962C8B-B14F-4D97-AF65-F5344CB8AC3E}">
+        <p14:creationId xmlns:p14="http://schemas.microsoft.com/office/powerpoint/2010/main" val="2432032485"/>
+      </p:ext>
+    </p:extLst>
+  </p:cSld>
+  <p:clrMapOvr>
+    <a:masterClrMapping/>
+  </p:clrMapOvr>
+</p:sld>
+</file>
+
+<file path=ppt/slides/slide14.xml><?xml version="1.0" encoding="utf-8"?>
 <p:sld xmlns:a="http://schemas.openxmlformats.org/drawingml/2006/main" xmlns:r="http://schemas.openxmlformats.org/officeDocument/2006/relationships" xmlns:p="http://schemas.openxmlformats.org/presentationml/2006/main">
   <p:cSld>
     <p:spTree>
@@ -3836,171 +4233,25 @@
           <a:p>
             <a:r>
               <a:rPr lang="en-US" dirty="0"/>
-              <a:t>Installed </a:t>
-            </a:r>
-            <a:r>
-              <a:rPr lang="en-US" dirty="0" err="1"/>
-              <a:t>Thonny</a:t>
-            </a:r>
-            <a:endParaRPr lang="en-US" dirty="0"/>
-          </a:p>
-          <a:p>
-            <a:r>
-              <a:rPr lang="en-US" dirty="0">
-                <a:solidFill>
-                  <a:srgbClr val="800080"/>
-                </a:solidFill>
-              </a:rPr>
-              <a:t>print</a:t>
-            </a:r>
+              <a:t>More about functions</a:t>
+            </a:r>
+          </a:p>
+          <a:p>
             <a:r>
               <a:rPr lang="en-US" dirty="0"/>
-              <a:t>(“Hello world”)</a:t>
+              <a:t>How do we make a simple grid</a:t>
             </a:r>
           </a:p>
           <a:p>
             <a:r>
               <a:rPr lang="en-US" dirty="0"/>
-              <a:t>Variables </a:t>
-            </a:r>
-          </a:p>
-          <a:p>
-            <a:pPr lvl="1"/>
-            <a:r>
-              <a:rPr lang="en-US" dirty="0">
-                <a:solidFill>
-                  <a:schemeClr val="bg2">
-                    <a:lumMod val="50000"/>
-                  </a:schemeClr>
-                </a:solidFill>
-              </a:rPr>
-              <a:t>variable</a:t>
-            </a:r>
+              <a:t>Discussed all things that were unclear</a:t>
+            </a:r>
+          </a:p>
+          <a:p>
             <a:r>
               <a:rPr lang="en-US" dirty="0"/>
-              <a:t> = “hello world”</a:t>
-            </a:r>
-          </a:p>
-          <a:p>
-            <a:pPr lvl="1"/>
-            <a:r>
-              <a:rPr lang="en-US" dirty="0">
-                <a:solidFill>
-                  <a:srgbClr val="7030A0"/>
-                </a:solidFill>
-              </a:rPr>
-              <a:t>print</a:t>
-            </a:r>
-            <a:r>
-              <a:rPr lang="en-US" dirty="0"/>
-              <a:t>(</a:t>
-            </a:r>
-            <a:r>
-              <a:rPr lang="en-US" dirty="0">
-                <a:solidFill>
-                  <a:schemeClr val="bg2">
-                    <a:lumMod val="50000"/>
-                  </a:schemeClr>
-                </a:solidFill>
-              </a:rPr>
-              <a:t>variable</a:t>
-            </a:r>
-            <a:r>
-              <a:rPr lang="en-US" dirty="0"/>
-              <a:t>)</a:t>
-            </a:r>
-          </a:p>
-          <a:p>
-            <a:r>
-              <a:rPr lang="en-US" dirty="0">
-                <a:solidFill>
-                  <a:srgbClr val="7030A0"/>
-                </a:solidFill>
-              </a:rPr>
-              <a:t>input</a:t>
-            </a:r>
-            <a:r>
-              <a:rPr lang="en-US" dirty="0"/>
-              <a:t>(“Enter something: ”)</a:t>
-            </a:r>
-          </a:p>
-          <a:p>
-            <a:r>
-              <a:rPr lang="en-US" dirty="0">
-                <a:solidFill>
-                  <a:srgbClr val="7030A0"/>
-                </a:solidFill>
-              </a:rPr>
-              <a:t>if</a:t>
-            </a:r>
-            <a:r>
-              <a:rPr lang="en-US" dirty="0"/>
-              <a:t> &amp; </a:t>
-            </a:r>
-            <a:r>
-              <a:rPr lang="en-US" dirty="0">
-                <a:solidFill>
-                  <a:srgbClr val="7030A0"/>
-                </a:solidFill>
-              </a:rPr>
-              <a:t>else</a:t>
-            </a:r>
-            <a:r>
-              <a:rPr lang="en-US" dirty="0">
-                <a:solidFill>
-                  <a:srgbClr val="800080"/>
-                </a:solidFill>
-              </a:rPr>
-              <a:t> </a:t>
-            </a:r>
-            <a:r>
-              <a:rPr lang="en-US" dirty="0"/>
-              <a:t>statement</a:t>
-            </a:r>
-            <a:endParaRPr lang="en-US" dirty="0">
-              <a:solidFill>
-                <a:srgbClr val="800080"/>
-              </a:solidFill>
-            </a:endParaRPr>
-          </a:p>
-          <a:p>
-            <a:r>
-              <a:rPr lang="en-US" dirty="0">
-                <a:solidFill>
-                  <a:srgbClr val="7030A0"/>
-                </a:solidFill>
-              </a:rPr>
-              <a:t>while</a:t>
-            </a:r>
-            <a:r>
-              <a:rPr lang="en-US" dirty="0"/>
-              <a:t>() loop</a:t>
-            </a:r>
-          </a:p>
-          <a:p>
-            <a:r>
-              <a:rPr lang="en-US" dirty="0">
-                <a:solidFill>
-                  <a:srgbClr val="7030A0"/>
-                </a:solidFill>
-              </a:rPr>
-              <a:t>int</a:t>
-            </a:r>
-            <a:r>
-              <a:rPr lang="en-US" dirty="0"/>
-              <a:t>(</a:t>
-            </a:r>
-            <a:r>
-              <a:rPr lang="en-US" dirty="0">
-                <a:solidFill>
-                  <a:srgbClr val="7030A0"/>
-                </a:solidFill>
-              </a:rPr>
-              <a:t>input</a:t>
-            </a:r>
-            <a:r>
-              <a:rPr lang="en-US" dirty="0"/>
-              <a:t>())</a:t>
+              <a:t>Talked about what you want to see in these lessons</a:t>
             </a:r>
           </a:p>
         </p:txBody>
@@ -4035,12 +4286,17 @@
               <a:rPr lang="en-US" dirty="0">
                 <a:latin typeface="+mj-lt"/>
               </a:rPr>
-              <a:t>Recap</a:t>
+              <a:t>Summary</a:t>
             </a:r>
           </a:p>
         </p:txBody>
       </p:sp>
     </p:spTree>
+    <p:extLst>
+      <p:ext uri="{BB962C8B-B14F-4D97-AF65-F5344CB8AC3E}">
+        <p14:creationId xmlns:p14="http://schemas.microsoft.com/office/powerpoint/2010/main" val="567166922"/>
+      </p:ext>
+    </p:extLst>
   </p:cSld>
   <p:clrMapOvr>
     <a:masterClrMapping/>
@@ -4048,7 +4304,7 @@
 </p:sld>
 </file>
 
-<file path=ppt/slides/slide3.xml><?xml version="1.0" encoding="utf-8"?>
+<file path=ppt/slides/slide2.xml><?xml version="1.0" encoding="utf-8"?>
 <p:sld xmlns:a="http://schemas.openxmlformats.org/drawingml/2006/main" xmlns:r="http://schemas.openxmlformats.org/officeDocument/2006/relationships" xmlns:p="http://schemas.openxmlformats.org/presentationml/2006/main">
   <p:cSld>
     <p:spTree>
@@ -4067,10 +4323,10 @@
       </p:grpSpPr>
       <p:sp>
         <p:nvSpPr>
-          <p:cNvPr id="2" name="Titel 1">
-            <a:extLst>
-              <a:ext uri="{FF2B5EF4-FFF2-40B4-BE49-F238E27FC236}">
-                <a16:creationId xmlns:a16="http://schemas.microsoft.com/office/drawing/2014/main" id="{1A5994EA-8A25-4ED1-A4BF-DCFE0592FDF9}"/>
+          <p:cNvPr id="5" name="Titel 1">
+            <a:extLst>
+              <a:ext uri="{FF2B5EF4-FFF2-40B4-BE49-F238E27FC236}">
+                <a16:creationId xmlns:a16="http://schemas.microsoft.com/office/drawing/2014/main" id="{A7CE0CFB-EBB2-4F24-8FEE-BA1C8A8EF32C}"/>
               </a:ext>
             </a:extLst>
           </p:cNvPr>
@@ -4092,48 +4348,20 @@
           <a:lstStyle/>
           <a:p>
             <a:r>
-              <a:rPr lang="en-US" dirty="0"/>
-              <a:t>Title</a:t>
-            </a:r>
-          </a:p>
-        </p:txBody>
-      </p:sp>
-    </p:spTree>
-    <p:extLst>
-      <p:ext uri="{BB962C8B-B14F-4D97-AF65-F5344CB8AC3E}">
-        <p14:creationId xmlns:p14="http://schemas.microsoft.com/office/powerpoint/2010/main" val="3565709754"/>
-      </p:ext>
-    </p:extLst>
-  </p:cSld>
-  <p:clrMapOvr>
-    <a:masterClrMapping/>
-  </p:clrMapOvr>
-</p:sld>
-</file>
-
-<file path=ppt/slides/slide4.xml><?xml version="1.0" encoding="utf-8"?>
-<p:sld xmlns:a="http://schemas.openxmlformats.org/drawingml/2006/main" xmlns:r="http://schemas.openxmlformats.org/officeDocument/2006/relationships" xmlns:p="http://schemas.openxmlformats.org/presentationml/2006/main">
-  <p:cSld>
-    <p:spTree>
-      <p:nvGrpSpPr>
-        <p:cNvPr id="1" name=""/>
-        <p:cNvGrpSpPr/>
-        <p:nvPr/>
-      </p:nvGrpSpPr>
-      <p:grpSpPr>
-        <a:xfrm>
-          <a:off x="0" y="0"/>
-          <a:ext cx="0" cy="0"/>
-          <a:chOff x="0" y="0"/>
-          <a:chExt cx="0" cy="0"/>
-        </a:xfrm>
-      </p:grpSpPr>
-      <p:sp>
-        <p:nvSpPr>
-          <p:cNvPr id="4" name="Tijdelijke aanduiding voor inhoud 2">
-            <a:extLst>
-              <a:ext uri="{FF2B5EF4-FFF2-40B4-BE49-F238E27FC236}">
-                <a16:creationId xmlns:a16="http://schemas.microsoft.com/office/drawing/2014/main" id="{DAFA2BF8-03DA-4833-A8C7-253038A569DC}"/>
+              <a:rPr lang="en-US" dirty="0">
+                <a:latin typeface="+mj-lt"/>
+              </a:rPr>
+              <a:t>Recap</a:t>
+            </a:r>
+          </a:p>
+        </p:txBody>
+      </p:sp>
+      <p:sp>
+        <p:nvSpPr>
+          <p:cNvPr id="7" name="Tijdelijke aanduiding voor inhoud 2">
+            <a:extLst>
+              <a:ext uri="{FF2B5EF4-FFF2-40B4-BE49-F238E27FC236}">
+                <a16:creationId xmlns:a16="http://schemas.microsoft.com/office/drawing/2014/main" id="{9BD9DAB5-D94B-4FAC-BC4F-B94ED0912CE5}"/>
               </a:ext>
             </a:extLst>
           </p:cNvPr>
@@ -4320,181 +4548,54 @@
           <a:p>
             <a:r>
               <a:rPr lang="en-US" dirty="0"/>
-              <a:t>Installed </a:t>
-            </a:r>
-            <a:r>
-              <a:rPr lang="en-US" dirty="0" err="1"/>
-              <a:t>Thonny</a:t>
-            </a:r>
-            <a:endParaRPr lang="en-US" dirty="0"/>
-          </a:p>
-          <a:p>
-            <a:r>
-              <a:rPr lang="en-US" dirty="0">
-                <a:solidFill>
-                  <a:srgbClr val="800080"/>
-                </a:solidFill>
-              </a:rPr>
-              <a:t>print</a:t>
-            </a:r>
+              <a:t>Functions</a:t>
+            </a:r>
+          </a:p>
+          <a:p>
             <a:r>
               <a:rPr lang="en-US" dirty="0"/>
-              <a:t>(“Hello world”)</a:t>
+              <a:t>libraries</a:t>
             </a:r>
           </a:p>
           <a:p>
             <a:r>
               <a:rPr lang="en-US" dirty="0"/>
-              <a:t>Variables </a:t>
-            </a:r>
-          </a:p>
-          <a:p>
-            <a:pPr lvl="1"/>
-            <a:r>
-              <a:rPr lang="en-US" dirty="0">
-                <a:solidFill>
-                  <a:schemeClr val="bg2">
-                    <a:lumMod val="50000"/>
-                  </a:schemeClr>
-                </a:solidFill>
-              </a:rPr>
-              <a:t>variable</a:t>
-            </a:r>
-            <a:r>
-              <a:rPr lang="en-US" dirty="0"/>
-              <a:t> = “hello world”</a:t>
-            </a:r>
-          </a:p>
-          <a:p>
-            <a:pPr lvl="1"/>
-            <a:r>
-              <a:rPr lang="en-US" dirty="0">
-                <a:solidFill>
-                  <a:srgbClr val="7030A0"/>
-                </a:solidFill>
-              </a:rPr>
-              <a:t>print</a:t>
-            </a:r>
-            <a:r>
-              <a:rPr lang="en-US" dirty="0"/>
-              <a:t>(</a:t>
-            </a:r>
-            <a:r>
-              <a:rPr lang="en-US" dirty="0">
-                <a:solidFill>
-                  <a:schemeClr val="bg2">
-                    <a:lumMod val="50000"/>
-                  </a:schemeClr>
-                </a:solidFill>
-              </a:rPr>
-              <a:t>variable</a:t>
-            </a:r>
-            <a:r>
-              <a:rPr lang="en-US" dirty="0"/>
-              <a:t>)</a:t>
-            </a:r>
-          </a:p>
-          <a:p>
-            <a:r>
-              <a:rPr lang="en-US" dirty="0">
-                <a:solidFill>
-                  <a:srgbClr val="7030A0"/>
-                </a:solidFill>
-              </a:rPr>
-              <a:t>input</a:t>
-            </a:r>
-            <a:r>
-              <a:rPr lang="en-US" dirty="0"/>
-              <a:t>(“Enter something: ”)</a:t>
-            </a:r>
-          </a:p>
-          <a:p>
-            <a:r>
-              <a:rPr lang="en-US" dirty="0">
-                <a:solidFill>
-                  <a:srgbClr val="7030A0"/>
-                </a:solidFill>
-              </a:rPr>
-              <a:t>if</a:t>
-            </a:r>
-            <a:r>
-              <a:rPr lang="en-US" dirty="0"/>
-              <a:t> &amp; </a:t>
-            </a:r>
-            <a:r>
-              <a:rPr lang="en-US" dirty="0">
-                <a:solidFill>
-                  <a:srgbClr val="7030A0"/>
-                </a:solidFill>
-              </a:rPr>
-              <a:t>else</a:t>
-            </a:r>
-            <a:r>
-              <a:rPr lang="en-US" dirty="0">
-                <a:solidFill>
-                  <a:srgbClr val="800080"/>
-                </a:solidFill>
-              </a:rPr>
-              <a:t> </a:t>
-            </a:r>
-            <a:r>
-              <a:rPr lang="en-US" dirty="0"/>
-              <a:t>statement</a:t>
-            </a:r>
-            <a:endParaRPr lang="en-US" dirty="0">
-              <a:solidFill>
-                <a:srgbClr val="800080"/>
-              </a:solidFill>
-            </a:endParaRPr>
-          </a:p>
-          <a:p>
-            <a:r>
-              <a:rPr lang="en-US" dirty="0">
-                <a:solidFill>
-                  <a:srgbClr val="7030A0"/>
-                </a:solidFill>
-              </a:rPr>
-              <a:t>while</a:t>
-            </a:r>
-            <a:r>
-              <a:rPr lang="en-US" dirty="0"/>
-              <a:t>() loop</a:t>
-            </a:r>
-          </a:p>
-          <a:p>
-            <a:r>
-              <a:rPr lang="en-US" dirty="0">
-                <a:solidFill>
-                  <a:srgbClr val="7030A0"/>
-                </a:solidFill>
-              </a:rPr>
-              <a:t>int</a:t>
-            </a:r>
-            <a:r>
-              <a:rPr lang="en-US" dirty="0"/>
-              <a:t>(</a:t>
-            </a:r>
-            <a:r>
-              <a:rPr lang="en-US" dirty="0">
-                <a:solidFill>
-                  <a:srgbClr val="7030A0"/>
-                </a:solidFill>
-              </a:rPr>
-              <a:t>input</a:t>
-            </a:r>
-            <a:r>
-              <a:rPr lang="en-US" dirty="0"/>
-              <a:t>())</a:t>
-            </a:r>
-          </a:p>
-        </p:txBody>
-      </p:sp>
-      <p:sp>
-        <p:nvSpPr>
-          <p:cNvPr id="5" name="Titel 1">
-            <a:extLst>
-              <a:ext uri="{FF2B5EF4-FFF2-40B4-BE49-F238E27FC236}">
-                <a16:creationId xmlns:a16="http://schemas.microsoft.com/office/drawing/2014/main" id="{A7CE0CFB-EBB2-4F24-8FEE-BA1C8A8EF32C}"/>
+              <a:t>Static methods</a:t>
+            </a:r>
+          </a:p>
+        </p:txBody>
+      </p:sp>
+    </p:spTree>
+  </p:cSld>
+  <p:clrMapOvr>
+    <a:masterClrMapping/>
+  </p:clrMapOvr>
+</p:sld>
+</file>
+
+<file path=ppt/slides/slide3.xml><?xml version="1.0" encoding="utf-8"?>
+<p:sld xmlns:a="http://schemas.openxmlformats.org/drawingml/2006/main" xmlns:r="http://schemas.openxmlformats.org/officeDocument/2006/relationships" xmlns:p="http://schemas.openxmlformats.org/presentationml/2006/main">
+  <p:cSld>
+    <p:spTree>
+      <p:nvGrpSpPr>
+        <p:cNvPr id="1" name=""/>
+        <p:cNvGrpSpPr/>
+        <p:nvPr/>
+      </p:nvGrpSpPr>
+      <p:grpSpPr>
+        <a:xfrm>
+          <a:off x="0" y="0"/>
+          <a:ext cx="0" cy="0"/>
+          <a:chOff x="0" y="0"/>
+          <a:chExt cx="0" cy="0"/>
+        </a:xfrm>
+      </p:grpSpPr>
+      <p:sp>
+        <p:nvSpPr>
+          <p:cNvPr id="2" name="Titel 1">
+            <a:extLst>
+              <a:ext uri="{FF2B5EF4-FFF2-40B4-BE49-F238E27FC236}">
+                <a16:creationId xmlns:a16="http://schemas.microsoft.com/office/drawing/2014/main" id="{1A5994EA-8A25-4ED1-A4BF-DCFE0592FDF9}"/>
               </a:ext>
             </a:extLst>
           </p:cNvPr>
@@ -4516,19 +4617,1861 @@
           <a:lstStyle/>
           <a:p>
             <a:r>
-              <a:rPr lang="en-US" dirty="0"/>
-              <a:t>Summary</a:t>
-            </a:r>
-            <a:endParaRPr lang="en-US" dirty="0">
-              <a:latin typeface="+mj-lt"/>
-            </a:endParaRPr>
-          </a:p>
-        </p:txBody>
-      </p:sp>
+              <a:rPr lang="en-US" dirty="0">
+                <a:latin typeface="+mj-lt"/>
+              </a:rPr>
+              <a:t>Example</a:t>
+            </a:r>
+          </a:p>
+        </p:txBody>
+      </p:sp>
+      <p:pic>
+        <p:nvPicPr>
+          <p:cNvPr id="3" name="Afbeelding 2">
+            <a:extLst>
+              <a:ext uri="{FF2B5EF4-FFF2-40B4-BE49-F238E27FC236}">
+                <a16:creationId xmlns:a16="http://schemas.microsoft.com/office/drawing/2014/main" id="{C4E1EFE1-E248-4045-97A7-F8A02991B7EE}"/>
+              </a:ext>
+            </a:extLst>
+          </p:cNvPr>
+          <p:cNvPicPr>
+            <a:picLocks noChangeAspect="1"/>
+          </p:cNvPicPr>
+          <p:nvPr/>
+        </p:nvPicPr>
+        <p:blipFill>
+          <a:blip r:embed="rId2"/>
+          <a:stretch>
+            <a:fillRect/>
+          </a:stretch>
+        </p:blipFill>
+        <p:spPr>
+          <a:xfrm>
+            <a:off x="3024187" y="2007150"/>
+            <a:ext cx="6143625" cy="1724025"/>
+          </a:xfrm>
+          <a:prstGeom prst="rect">
+            <a:avLst/>
+          </a:prstGeom>
+        </p:spPr>
+      </p:pic>
     </p:spTree>
     <p:extLst>
       <p:ext uri="{BB962C8B-B14F-4D97-AF65-F5344CB8AC3E}">
-        <p14:creationId xmlns:p14="http://schemas.microsoft.com/office/powerpoint/2010/main" val="567166922"/>
+        <p14:creationId xmlns:p14="http://schemas.microsoft.com/office/powerpoint/2010/main" val="3565709754"/>
+      </p:ext>
+    </p:extLst>
+  </p:cSld>
+  <p:clrMapOvr>
+    <a:masterClrMapping/>
+  </p:clrMapOvr>
+</p:sld>
+</file>
+
+<file path=ppt/slides/slide4.xml><?xml version="1.0" encoding="utf-8"?>
+<p:sld xmlns:a="http://schemas.openxmlformats.org/drawingml/2006/main" xmlns:r="http://schemas.openxmlformats.org/officeDocument/2006/relationships" xmlns:p="http://schemas.openxmlformats.org/presentationml/2006/main">
+  <p:cSld>
+    <p:spTree>
+      <p:nvGrpSpPr>
+        <p:cNvPr id="1" name=""/>
+        <p:cNvGrpSpPr/>
+        <p:nvPr/>
+      </p:nvGrpSpPr>
+      <p:grpSpPr>
+        <a:xfrm>
+          <a:off x="0" y="0"/>
+          <a:ext cx="0" cy="0"/>
+          <a:chOff x="0" y="0"/>
+          <a:chExt cx="0" cy="0"/>
+        </a:xfrm>
+      </p:grpSpPr>
+      <p:pic>
+        <p:nvPicPr>
+          <p:cNvPr id="4" name="Afbeelding 3">
+            <a:extLst>
+              <a:ext uri="{FF2B5EF4-FFF2-40B4-BE49-F238E27FC236}">
+                <a16:creationId xmlns:a16="http://schemas.microsoft.com/office/drawing/2014/main" id="{5B683F25-2EF4-4A50-84B5-6E57CDF13E30}"/>
+              </a:ext>
+            </a:extLst>
+          </p:cNvPr>
+          <p:cNvPicPr>
+            <a:picLocks noChangeAspect="1"/>
+          </p:cNvPicPr>
+          <p:nvPr/>
+        </p:nvPicPr>
+        <p:blipFill>
+          <a:blip r:embed="rId2"/>
+          <a:stretch>
+            <a:fillRect/>
+          </a:stretch>
+        </p:blipFill>
+        <p:spPr>
+          <a:xfrm>
+            <a:off x="909637" y="1690688"/>
+            <a:ext cx="10372725" cy="2609850"/>
+          </a:xfrm>
+          <a:prstGeom prst="rect">
+            <a:avLst/>
+          </a:prstGeom>
+        </p:spPr>
+      </p:pic>
+      <p:pic>
+        <p:nvPicPr>
+          <p:cNvPr id="5" name="Afbeelding 4">
+            <a:extLst>
+              <a:ext uri="{FF2B5EF4-FFF2-40B4-BE49-F238E27FC236}">
+                <a16:creationId xmlns:a16="http://schemas.microsoft.com/office/drawing/2014/main" id="{DE80EC9C-B0BD-4F58-A731-5B14690870DF}"/>
+              </a:ext>
+            </a:extLst>
+          </p:cNvPr>
+          <p:cNvPicPr>
+            <a:picLocks noChangeAspect="1"/>
+          </p:cNvPicPr>
+          <p:nvPr/>
+        </p:nvPicPr>
+        <p:blipFill>
+          <a:blip r:embed="rId3"/>
+          <a:stretch>
+            <a:fillRect/>
+          </a:stretch>
+        </p:blipFill>
+        <p:spPr>
+          <a:xfrm>
+            <a:off x="838200" y="4595812"/>
+            <a:ext cx="7639050" cy="1323975"/>
+          </a:xfrm>
+          <a:prstGeom prst="rect">
+            <a:avLst/>
+          </a:prstGeom>
+        </p:spPr>
+      </p:pic>
+      <p:sp>
+        <p:nvSpPr>
+          <p:cNvPr id="6" name="Titel 1">
+            <a:extLst>
+              <a:ext uri="{FF2B5EF4-FFF2-40B4-BE49-F238E27FC236}">
+                <a16:creationId xmlns:a16="http://schemas.microsoft.com/office/drawing/2014/main" id="{21766031-31E2-4137-A46D-AD326A04C84A}"/>
+              </a:ext>
+            </a:extLst>
+          </p:cNvPr>
+          <p:cNvSpPr>
+            <a:spLocks noGrp="1"/>
+          </p:cNvSpPr>
+          <p:nvPr>
+            <p:ph type="title"/>
+          </p:nvPr>
+        </p:nvSpPr>
+        <p:spPr>
+          <a:xfrm>
+            <a:off x="838200" y="365125"/>
+            <a:ext cx="10515600" cy="1325563"/>
+          </a:xfrm>
+        </p:spPr>
+        <p:txBody>
+          <a:bodyPr/>
+          <a:lstStyle/>
+          <a:p>
+            <a:r>
+              <a:rPr lang="en-US" dirty="0">
+                <a:latin typeface="+mj-lt"/>
+              </a:rPr>
+              <a:t>Example</a:t>
+            </a:r>
+          </a:p>
+        </p:txBody>
+      </p:sp>
+    </p:spTree>
+    <p:extLst>
+      <p:ext uri="{BB962C8B-B14F-4D97-AF65-F5344CB8AC3E}">
+        <p14:creationId xmlns:p14="http://schemas.microsoft.com/office/powerpoint/2010/main" val="4032282785"/>
+      </p:ext>
+    </p:extLst>
+  </p:cSld>
+  <p:clrMapOvr>
+    <a:masterClrMapping/>
+  </p:clrMapOvr>
+</p:sld>
+</file>
+
+<file path=ppt/slides/slide5.xml><?xml version="1.0" encoding="utf-8"?>
+<p:sld xmlns:a="http://schemas.openxmlformats.org/drawingml/2006/main" xmlns:r="http://schemas.openxmlformats.org/officeDocument/2006/relationships" xmlns:p="http://schemas.openxmlformats.org/presentationml/2006/main">
+  <p:cSld>
+    <p:spTree>
+      <p:nvGrpSpPr>
+        <p:cNvPr id="1" name=""/>
+        <p:cNvGrpSpPr/>
+        <p:nvPr/>
+      </p:nvGrpSpPr>
+      <p:grpSpPr>
+        <a:xfrm>
+          <a:off x="0" y="0"/>
+          <a:ext cx="0" cy="0"/>
+          <a:chOff x="0" y="0"/>
+          <a:chExt cx="0" cy="0"/>
+        </a:xfrm>
+      </p:grpSpPr>
+      <p:sp>
+        <p:nvSpPr>
+          <p:cNvPr id="4" name="Titel 1">
+            <a:extLst>
+              <a:ext uri="{FF2B5EF4-FFF2-40B4-BE49-F238E27FC236}">
+                <a16:creationId xmlns:a16="http://schemas.microsoft.com/office/drawing/2014/main" id="{A1501A86-5035-4C26-BED0-89591934B33C}"/>
+              </a:ext>
+            </a:extLst>
+          </p:cNvPr>
+          <p:cNvSpPr>
+            <a:spLocks noGrp="1"/>
+          </p:cNvSpPr>
+          <p:nvPr>
+            <p:ph type="title"/>
+          </p:nvPr>
+        </p:nvSpPr>
+        <p:spPr>
+          <a:xfrm>
+            <a:off x="838200" y="365125"/>
+            <a:ext cx="10515600" cy="1325563"/>
+          </a:xfrm>
+        </p:spPr>
+        <p:txBody>
+          <a:bodyPr/>
+          <a:lstStyle/>
+          <a:p>
+            <a:r>
+              <a:rPr lang="en-US" dirty="0">
+                <a:latin typeface="+mj-lt"/>
+              </a:rPr>
+              <a:t>Exercises (30 min)</a:t>
+            </a:r>
+          </a:p>
+        </p:txBody>
+      </p:sp>
+      <p:sp>
+        <p:nvSpPr>
+          <p:cNvPr id="5" name="Tekstvak 4">
+            <a:extLst>
+              <a:ext uri="{FF2B5EF4-FFF2-40B4-BE49-F238E27FC236}">
+                <a16:creationId xmlns:a16="http://schemas.microsoft.com/office/drawing/2014/main" id="{5B3C4DD8-08EA-45D7-8E30-659CAE0A5F30}"/>
+              </a:ext>
+            </a:extLst>
+          </p:cNvPr>
+          <p:cNvSpPr txBox="1"/>
+          <p:nvPr/>
+        </p:nvSpPr>
+        <p:spPr>
+          <a:xfrm>
+            <a:off x="838200" y="1431043"/>
+            <a:ext cx="8816622" cy="4770537"/>
+          </a:xfrm>
+          <a:prstGeom prst="rect">
+            <a:avLst/>
+          </a:prstGeom>
+          <a:noFill/>
+        </p:spPr>
+        <p:txBody>
+          <a:bodyPr wrap="square" rtlCol="0">
+            <a:spAutoFit/>
+          </a:bodyPr>
+          <a:lstStyle/>
+          <a:p>
+            <a:pPr algn="ctr"/>
+            <a:r>
+              <a:rPr lang="nl-NL" sz="2400" b="1" dirty="0" err="1"/>
+              <a:t>Use</a:t>
+            </a:r>
+            <a:r>
+              <a:rPr lang="nl-NL" sz="2400" b="1" dirty="0"/>
+              <a:t> </a:t>
+            </a:r>
+            <a:r>
+              <a:rPr lang="nl-NL" sz="2400" b="1" dirty="0" err="1"/>
+              <a:t>the</a:t>
+            </a:r>
+            <a:r>
+              <a:rPr lang="nl-NL" sz="2400" b="1" dirty="0"/>
+              <a:t> </a:t>
+            </a:r>
+            <a:r>
+              <a:rPr lang="nl-NL" sz="2400" b="1" dirty="0" err="1"/>
+              <a:t>math</a:t>
+            </a:r>
+            <a:r>
+              <a:rPr lang="nl-NL" sz="2400" b="1" dirty="0"/>
+              <a:t> </a:t>
+            </a:r>
+            <a:r>
+              <a:rPr lang="nl-NL" sz="2400" b="1" dirty="0" err="1"/>
+              <a:t>library</a:t>
+            </a:r>
+            <a:endParaRPr lang="nl-NL" sz="2000" b="1" dirty="0"/>
+          </a:p>
+          <a:p>
+            <a:pPr marL="285750" indent="-285750">
+              <a:buFont typeface="Arial" panose="020B0604020202020204" pitchFamily="34" charset="0"/>
+              <a:buChar char="•"/>
+            </a:pPr>
+            <a:r>
+              <a:rPr lang="nl-NL" sz="2000" dirty="0" err="1"/>
+              <a:t>Create</a:t>
+            </a:r>
+            <a:r>
+              <a:rPr lang="nl-NL" sz="2000" dirty="0"/>
+              <a:t> a </a:t>
+            </a:r>
+            <a:r>
+              <a:rPr lang="nl-NL" sz="2000" dirty="0" err="1"/>
+              <a:t>function</a:t>
+            </a:r>
+            <a:r>
+              <a:rPr lang="nl-NL" sz="2000" dirty="0"/>
+              <a:t> </a:t>
+            </a:r>
+            <a:r>
+              <a:rPr lang="nl-NL" sz="2000" dirty="0" err="1"/>
+              <a:t>that</a:t>
+            </a:r>
+            <a:r>
+              <a:rPr lang="nl-NL" sz="2000" dirty="0"/>
+              <a:t> takes 1 parameter </a:t>
+            </a:r>
+            <a:r>
+              <a:rPr lang="nl-NL" sz="2000" dirty="0" err="1"/>
+              <a:t>that</a:t>
+            </a:r>
+            <a:r>
+              <a:rPr lang="nl-NL" sz="2000" dirty="0"/>
+              <a:t> </a:t>
+            </a:r>
+            <a:r>
+              <a:rPr lang="nl-NL" sz="2000" dirty="0" err="1"/>
+              <a:t>will</a:t>
+            </a:r>
+            <a:r>
+              <a:rPr lang="nl-NL" sz="2000" dirty="0"/>
+              <a:t> </a:t>
+            </a:r>
+            <a:r>
+              <a:rPr lang="nl-NL" sz="2000" dirty="0" err="1"/>
+              <a:t>be</a:t>
+            </a:r>
+            <a:r>
+              <a:rPr lang="nl-NL" sz="2000" dirty="0"/>
+              <a:t> </a:t>
+            </a:r>
+            <a:r>
+              <a:rPr lang="nl-NL" sz="2000" dirty="0" err="1"/>
+              <a:t>the</a:t>
+            </a:r>
+            <a:r>
+              <a:rPr lang="nl-NL" sz="2000" dirty="0"/>
+              <a:t> </a:t>
+            </a:r>
+            <a:r>
+              <a:rPr lang="nl-NL" sz="2000" dirty="0" err="1"/>
+              <a:t>number</a:t>
+            </a:r>
+            <a:r>
+              <a:rPr lang="nl-NL" sz="2000" dirty="0"/>
+              <a:t> </a:t>
+            </a:r>
+            <a:r>
+              <a:rPr lang="nl-NL" sz="2000" dirty="0" err="1"/>
+              <a:t>given</a:t>
+            </a:r>
+            <a:r>
+              <a:rPr lang="nl-NL" sz="2000" dirty="0"/>
+              <a:t> </a:t>
+            </a:r>
+            <a:r>
+              <a:rPr lang="nl-NL" sz="2000" dirty="0" err="1"/>
+              <a:t>by</a:t>
+            </a:r>
+            <a:r>
+              <a:rPr lang="nl-NL" sz="2000" dirty="0"/>
+              <a:t> </a:t>
+            </a:r>
+            <a:r>
+              <a:rPr lang="nl-NL" sz="2000" dirty="0" err="1"/>
+              <a:t>the</a:t>
+            </a:r>
+            <a:r>
+              <a:rPr lang="nl-NL" sz="2000" dirty="0"/>
+              <a:t> user.</a:t>
+            </a:r>
+          </a:p>
+          <a:p>
+            <a:pPr marL="285750" indent="-285750">
+              <a:buFont typeface="Arial" panose="020B0604020202020204" pitchFamily="34" charset="0"/>
+              <a:buChar char="•"/>
+            </a:pPr>
+            <a:r>
+              <a:rPr lang="nl-NL" sz="2000" dirty="0" err="1"/>
+              <a:t>Give</a:t>
+            </a:r>
+            <a:r>
+              <a:rPr lang="nl-NL" sz="2000" dirty="0"/>
+              <a:t> power of </a:t>
+            </a:r>
+            <a:r>
+              <a:rPr lang="nl-NL" sz="2000" dirty="0" err="1"/>
+              <a:t>from</a:t>
+            </a:r>
+            <a:r>
+              <a:rPr lang="nl-NL" sz="2000" dirty="0"/>
+              <a:t> 1 </a:t>
+            </a:r>
+            <a:r>
+              <a:rPr lang="nl-NL" sz="2000" dirty="0" err="1"/>
+              <a:t>to</a:t>
+            </a:r>
+            <a:r>
+              <a:rPr lang="nl-NL" sz="2000" dirty="0"/>
+              <a:t> </a:t>
+            </a:r>
+            <a:r>
+              <a:rPr lang="nl-NL" sz="2000" dirty="0" err="1"/>
+              <a:t>the</a:t>
+            </a:r>
+            <a:r>
+              <a:rPr lang="nl-NL" sz="2000" dirty="0"/>
+              <a:t> </a:t>
+            </a:r>
+            <a:r>
+              <a:rPr lang="nl-NL" sz="2000" dirty="0" err="1"/>
+              <a:t>number</a:t>
+            </a:r>
+            <a:r>
+              <a:rPr lang="nl-NL" sz="2000" dirty="0"/>
+              <a:t> </a:t>
+            </a:r>
+            <a:r>
+              <a:rPr lang="nl-NL" sz="2000" dirty="0" err="1"/>
+              <a:t>given</a:t>
+            </a:r>
+            <a:r>
+              <a:rPr lang="nl-NL" sz="2000" dirty="0"/>
+              <a:t> </a:t>
+            </a:r>
+            <a:r>
+              <a:rPr lang="nl-NL" sz="2000" dirty="0" err="1"/>
+              <a:t>by</a:t>
+            </a:r>
+            <a:r>
+              <a:rPr lang="nl-NL" sz="2000" dirty="0"/>
+              <a:t> </a:t>
+            </a:r>
+            <a:r>
+              <a:rPr lang="nl-NL" sz="2000" dirty="0" err="1"/>
+              <a:t>the</a:t>
+            </a:r>
+            <a:r>
+              <a:rPr lang="nl-NL" sz="2000" dirty="0"/>
+              <a:t> user</a:t>
+            </a:r>
+          </a:p>
+          <a:p>
+            <a:pPr marL="285750" indent="-285750">
+              <a:buFont typeface="Arial" panose="020B0604020202020204" pitchFamily="34" charset="0"/>
+              <a:buChar char="•"/>
+            </a:pPr>
+            <a:r>
+              <a:rPr lang="nl-NL" sz="2000" dirty="0" err="1"/>
+              <a:t>So</a:t>
+            </a:r>
+            <a:r>
+              <a:rPr lang="nl-NL" sz="2000" dirty="0"/>
+              <a:t> </a:t>
+            </a:r>
+            <a:r>
+              <a:rPr lang="nl-NL" sz="2000" dirty="0" err="1"/>
+              <a:t>if</a:t>
+            </a:r>
+            <a:r>
+              <a:rPr lang="nl-NL" sz="2000" dirty="0"/>
+              <a:t> </a:t>
+            </a:r>
+            <a:r>
+              <a:rPr lang="nl-NL" sz="2000" dirty="0" err="1"/>
+              <a:t>the</a:t>
+            </a:r>
+            <a:r>
+              <a:rPr lang="nl-NL" sz="2000" dirty="0"/>
+              <a:t> user enter </a:t>
+            </a:r>
+            <a:r>
+              <a:rPr lang="nl-NL" sz="2000" dirty="0" err="1"/>
+              <a:t>the</a:t>
+            </a:r>
+            <a:r>
+              <a:rPr lang="nl-NL" sz="2000" dirty="0"/>
+              <a:t> </a:t>
+            </a:r>
+            <a:r>
+              <a:rPr lang="nl-NL" sz="2000" dirty="0" err="1"/>
+              <a:t>number</a:t>
+            </a:r>
+            <a:r>
+              <a:rPr lang="nl-NL" sz="2000" dirty="0"/>
+              <a:t> 5 </a:t>
+            </a:r>
+            <a:r>
+              <a:rPr lang="nl-NL" sz="2000" dirty="0" err="1"/>
+              <a:t>the</a:t>
+            </a:r>
+            <a:r>
+              <a:rPr lang="nl-NL" sz="2000" dirty="0"/>
+              <a:t> </a:t>
+            </a:r>
+            <a:r>
+              <a:rPr lang="nl-NL" sz="2000" dirty="0" err="1"/>
+              <a:t>function</a:t>
+            </a:r>
+            <a:r>
+              <a:rPr lang="nl-NL" sz="2000" dirty="0"/>
+              <a:t> </a:t>
+            </a:r>
+            <a:r>
+              <a:rPr lang="nl-NL" sz="2000" dirty="0" err="1"/>
+              <a:t>will</a:t>
+            </a:r>
+            <a:r>
+              <a:rPr lang="nl-NL" sz="2000" dirty="0"/>
+              <a:t> </a:t>
+            </a:r>
+            <a:r>
+              <a:rPr lang="nl-NL" sz="2000" b="1" dirty="0"/>
+              <a:t>print</a:t>
+            </a:r>
+          </a:p>
+          <a:p>
+            <a:pPr marL="285750" indent="-285750">
+              <a:buFont typeface="Arial" panose="020B0604020202020204" pitchFamily="34" charset="0"/>
+              <a:buChar char="•"/>
+            </a:pPr>
+            <a:r>
+              <a:rPr lang="nl-NL" sz="2000" dirty="0"/>
+              <a:t>1² = 1</a:t>
+            </a:r>
+          </a:p>
+          <a:p>
+            <a:pPr marL="285750" indent="-285750">
+              <a:buFont typeface="Arial" panose="020B0604020202020204" pitchFamily="34" charset="0"/>
+              <a:buChar char="•"/>
+            </a:pPr>
+            <a:r>
+              <a:rPr lang="nl-NL" sz="2000" dirty="0"/>
+              <a:t>2² = 4</a:t>
+            </a:r>
+          </a:p>
+          <a:p>
+            <a:pPr marL="285750" indent="-285750">
+              <a:buFont typeface="Arial" panose="020B0604020202020204" pitchFamily="34" charset="0"/>
+              <a:buChar char="•"/>
+            </a:pPr>
+            <a:r>
+              <a:rPr lang="nl-NL" sz="2000" dirty="0"/>
+              <a:t>…</a:t>
+            </a:r>
+          </a:p>
+          <a:p>
+            <a:r>
+              <a:rPr lang="nl-NL" sz="2000" dirty="0"/>
+              <a:t>--------------------------------------------------------------------------------------------------------------</a:t>
+            </a:r>
+          </a:p>
+          <a:p>
+            <a:pPr marL="285750" indent="-285750">
+              <a:buFont typeface="Arial" panose="020B0604020202020204" pitchFamily="34" charset="0"/>
+              <a:buChar char="•"/>
+            </a:pPr>
+            <a:r>
+              <a:rPr lang="nl-NL" sz="2000" dirty="0" err="1"/>
+              <a:t>Create</a:t>
+            </a:r>
+            <a:r>
+              <a:rPr lang="nl-NL" sz="2000" dirty="0"/>
+              <a:t> a second </a:t>
+            </a:r>
+            <a:r>
+              <a:rPr lang="nl-NL" sz="2000" dirty="0" err="1"/>
+              <a:t>function</a:t>
+            </a:r>
+            <a:r>
+              <a:rPr lang="nl-NL" sz="2000" dirty="0"/>
+              <a:t> </a:t>
+            </a:r>
+            <a:r>
+              <a:rPr lang="nl-NL" sz="2000" dirty="0" err="1"/>
+              <a:t>that</a:t>
+            </a:r>
+            <a:r>
+              <a:rPr lang="nl-NL" sz="2000" dirty="0"/>
+              <a:t> </a:t>
+            </a:r>
+            <a:r>
+              <a:rPr lang="nl-NL" sz="2000" dirty="0" err="1"/>
+              <a:t>also</a:t>
+            </a:r>
+            <a:r>
+              <a:rPr lang="nl-NL" sz="2000" dirty="0"/>
+              <a:t> takes 1 parameter </a:t>
+            </a:r>
+            <a:r>
+              <a:rPr lang="nl-NL" sz="2000" dirty="0" err="1"/>
+              <a:t>that</a:t>
+            </a:r>
+            <a:r>
+              <a:rPr lang="nl-NL" sz="2000" dirty="0"/>
+              <a:t> </a:t>
+            </a:r>
+            <a:r>
+              <a:rPr lang="nl-NL" sz="2000" dirty="0" err="1"/>
+              <a:t>will</a:t>
+            </a:r>
+            <a:r>
+              <a:rPr lang="nl-NL" sz="2000" dirty="0"/>
+              <a:t> </a:t>
+            </a:r>
+            <a:r>
+              <a:rPr lang="nl-NL" sz="2000" dirty="0" err="1"/>
+              <a:t>be</a:t>
+            </a:r>
+            <a:r>
+              <a:rPr lang="nl-NL" sz="2000" dirty="0"/>
+              <a:t> </a:t>
+            </a:r>
+            <a:r>
+              <a:rPr lang="nl-NL" sz="2000" dirty="0" err="1"/>
+              <a:t>the</a:t>
+            </a:r>
+            <a:r>
+              <a:rPr lang="nl-NL" sz="2000" dirty="0"/>
+              <a:t> </a:t>
+            </a:r>
+            <a:r>
+              <a:rPr lang="nl-NL" sz="2000" dirty="0" err="1"/>
+              <a:t>number</a:t>
+            </a:r>
+            <a:r>
+              <a:rPr lang="nl-NL" sz="2000" dirty="0"/>
+              <a:t> </a:t>
+            </a:r>
+            <a:r>
+              <a:rPr lang="nl-NL" sz="2000" dirty="0" err="1"/>
+              <a:t>given</a:t>
+            </a:r>
+            <a:r>
+              <a:rPr lang="nl-NL" sz="2000" dirty="0"/>
+              <a:t> </a:t>
+            </a:r>
+            <a:r>
+              <a:rPr lang="nl-NL" sz="2000" dirty="0" err="1"/>
+              <a:t>by</a:t>
+            </a:r>
+            <a:r>
+              <a:rPr lang="nl-NL" sz="2000" dirty="0"/>
+              <a:t> </a:t>
+            </a:r>
+            <a:r>
+              <a:rPr lang="nl-NL" sz="2000" dirty="0" err="1"/>
+              <a:t>the</a:t>
+            </a:r>
+            <a:r>
+              <a:rPr lang="nl-NL" sz="2000" dirty="0"/>
+              <a:t> user</a:t>
+            </a:r>
+          </a:p>
+          <a:p>
+            <a:pPr marL="285750" indent="-285750">
+              <a:buFont typeface="Arial" panose="020B0604020202020204" pitchFamily="34" charset="0"/>
+              <a:buChar char="•"/>
+            </a:pPr>
+            <a:r>
+              <a:rPr lang="nl-NL" sz="2000" dirty="0"/>
+              <a:t>Go </a:t>
+            </a:r>
+            <a:r>
+              <a:rPr lang="nl-NL" sz="2000" dirty="0" err="1"/>
+              <a:t>from</a:t>
+            </a:r>
+            <a:r>
+              <a:rPr lang="nl-NL" sz="2000" dirty="0"/>
+              <a:t> 1 </a:t>
+            </a:r>
+            <a:r>
+              <a:rPr lang="nl-NL" sz="2000" dirty="0" err="1"/>
+              <a:t>to</a:t>
+            </a:r>
+            <a:r>
+              <a:rPr lang="nl-NL" sz="2000" dirty="0"/>
+              <a:t> </a:t>
+            </a:r>
+            <a:r>
+              <a:rPr lang="nl-NL" sz="2000" dirty="0" err="1"/>
+              <a:t>the</a:t>
+            </a:r>
+            <a:r>
+              <a:rPr lang="nl-NL" sz="2000" dirty="0"/>
+              <a:t> user input</a:t>
+            </a:r>
+          </a:p>
+          <a:p>
+            <a:pPr marL="285750" indent="-285750">
+              <a:buFont typeface="Arial" panose="020B0604020202020204" pitchFamily="34" charset="0"/>
+              <a:buChar char="•"/>
+            </a:pPr>
+            <a:r>
+              <a:rPr lang="nl-NL" sz="2000" dirty="0"/>
+              <a:t>At </a:t>
+            </a:r>
+            <a:r>
+              <a:rPr lang="nl-NL" sz="2000" dirty="0" err="1"/>
+              <a:t>every</a:t>
+            </a:r>
+            <a:r>
+              <a:rPr lang="nl-NL" sz="2000" dirty="0"/>
+              <a:t> point </a:t>
+            </a:r>
+            <a:r>
+              <a:rPr lang="nl-NL" sz="2000" dirty="0" err="1"/>
+              <a:t>you</a:t>
+            </a:r>
+            <a:r>
+              <a:rPr lang="nl-NL" sz="2000" dirty="0"/>
+              <a:t> </a:t>
+            </a:r>
+            <a:r>
+              <a:rPr lang="nl-NL" sz="2000" dirty="0" err="1"/>
+              <a:t>add</a:t>
+            </a:r>
+            <a:r>
+              <a:rPr lang="nl-NL" sz="2000" dirty="0"/>
+              <a:t> </a:t>
+            </a:r>
+            <a:r>
+              <a:rPr lang="nl-NL" sz="2000" dirty="0" err="1"/>
+              <a:t>the</a:t>
+            </a:r>
+            <a:r>
+              <a:rPr lang="nl-NL" sz="2000" dirty="0"/>
+              <a:t> </a:t>
+            </a:r>
+            <a:r>
+              <a:rPr lang="nl-NL" sz="2000" dirty="0" err="1"/>
+              <a:t>result</a:t>
+            </a:r>
+            <a:r>
+              <a:rPr lang="nl-NL" sz="2000" dirty="0"/>
+              <a:t> </a:t>
+            </a:r>
+            <a:r>
+              <a:rPr lang="nl-NL" sz="2000" dirty="0" err="1"/>
+              <a:t>from</a:t>
+            </a:r>
+            <a:r>
+              <a:rPr lang="nl-NL" sz="2000" dirty="0"/>
+              <a:t> </a:t>
+            </a:r>
+            <a:r>
+              <a:rPr lang="nl-NL" sz="2000" dirty="0" err="1"/>
+              <a:t>the</a:t>
+            </a:r>
+            <a:r>
+              <a:rPr lang="nl-NL" sz="2000" dirty="0"/>
+              <a:t> power of </a:t>
+            </a:r>
+            <a:r>
+              <a:rPr lang="nl-NL" sz="2000" dirty="0" err="1"/>
+              <a:t>the</a:t>
+            </a:r>
+            <a:r>
+              <a:rPr lang="nl-NL" sz="2000" dirty="0"/>
+              <a:t> </a:t>
+            </a:r>
+            <a:r>
+              <a:rPr lang="nl-NL" sz="2000" dirty="0" err="1"/>
+              <a:t>number</a:t>
+            </a:r>
+            <a:r>
+              <a:rPr lang="nl-NL" sz="2000" dirty="0"/>
+              <a:t> </a:t>
+            </a:r>
+            <a:r>
+              <a:rPr lang="nl-NL" sz="2000" dirty="0" err="1"/>
+              <a:t>to</a:t>
+            </a:r>
+            <a:r>
+              <a:rPr lang="nl-NL" sz="2000" dirty="0"/>
+              <a:t> </a:t>
+            </a:r>
+            <a:r>
+              <a:rPr lang="nl-NL" sz="2000" dirty="0" err="1"/>
+              <a:t>the</a:t>
+            </a:r>
+            <a:r>
+              <a:rPr lang="nl-NL" sz="2000" dirty="0"/>
+              <a:t> </a:t>
+            </a:r>
+            <a:r>
+              <a:rPr lang="nl-NL" sz="2000" dirty="0" err="1"/>
+              <a:t>value</a:t>
+            </a:r>
+            <a:r>
+              <a:rPr lang="nl-NL" sz="2000" dirty="0"/>
+              <a:t>.</a:t>
+            </a:r>
+          </a:p>
+          <a:p>
+            <a:pPr marL="285750" indent="-285750">
+              <a:buFont typeface="Arial" panose="020B0604020202020204" pitchFamily="34" charset="0"/>
+              <a:buChar char="•"/>
+            </a:pPr>
+            <a:r>
+              <a:rPr lang="nl-NL" sz="2000" dirty="0" err="1"/>
+              <a:t>So</a:t>
+            </a:r>
+            <a:r>
+              <a:rPr lang="nl-NL" sz="2000" dirty="0"/>
+              <a:t> </a:t>
+            </a:r>
+            <a:r>
+              <a:rPr lang="nl-NL" sz="2000" dirty="0" err="1"/>
+              <a:t>if</a:t>
+            </a:r>
+            <a:r>
+              <a:rPr lang="nl-NL" sz="2000" dirty="0"/>
+              <a:t> </a:t>
+            </a:r>
+            <a:r>
+              <a:rPr lang="nl-NL" sz="2000" dirty="0" err="1"/>
+              <a:t>the</a:t>
+            </a:r>
+            <a:r>
+              <a:rPr lang="nl-NL" sz="2000" dirty="0"/>
+              <a:t> user enters 5 </a:t>
+            </a:r>
+            <a:r>
+              <a:rPr lang="nl-NL" sz="2000" dirty="0" err="1"/>
+              <a:t>the</a:t>
+            </a:r>
+            <a:r>
+              <a:rPr lang="nl-NL" sz="2000" dirty="0"/>
+              <a:t> </a:t>
+            </a:r>
+            <a:r>
+              <a:rPr lang="nl-NL" sz="2000" b="1" dirty="0" err="1"/>
+              <a:t>returned</a:t>
+            </a:r>
+            <a:r>
+              <a:rPr lang="nl-NL" sz="2000" dirty="0"/>
+              <a:t> </a:t>
+            </a:r>
+            <a:r>
+              <a:rPr lang="nl-NL" sz="2000" dirty="0" err="1"/>
+              <a:t>result</a:t>
+            </a:r>
+            <a:r>
+              <a:rPr lang="nl-NL" sz="2000" dirty="0"/>
+              <a:t> </a:t>
+            </a:r>
+            <a:r>
+              <a:rPr lang="nl-NL" sz="2000" dirty="0" err="1"/>
+              <a:t>from</a:t>
+            </a:r>
+            <a:r>
+              <a:rPr lang="nl-NL" sz="2000" dirty="0"/>
+              <a:t> </a:t>
+            </a:r>
+            <a:r>
+              <a:rPr lang="nl-NL" sz="2000" dirty="0" err="1"/>
+              <a:t>the</a:t>
+            </a:r>
+            <a:r>
+              <a:rPr lang="nl-NL" sz="2000" dirty="0"/>
+              <a:t> </a:t>
+            </a:r>
+            <a:r>
+              <a:rPr lang="nl-NL" sz="2000" dirty="0" err="1"/>
+              <a:t>function</a:t>
+            </a:r>
+            <a:r>
+              <a:rPr lang="nl-NL" sz="2000" dirty="0"/>
+              <a:t> </a:t>
+            </a:r>
+            <a:r>
+              <a:rPr lang="nl-NL" sz="2000" dirty="0" err="1"/>
+              <a:t>should</a:t>
+            </a:r>
+            <a:r>
+              <a:rPr lang="nl-NL" sz="2000" dirty="0"/>
+              <a:t> </a:t>
+            </a:r>
+            <a:r>
+              <a:rPr lang="nl-NL" sz="2000" dirty="0" err="1"/>
+              <a:t>be</a:t>
+            </a:r>
+            <a:endParaRPr lang="nl-NL" sz="2000" dirty="0"/>
+          </a:p>
+          <a:p>
+            <a:pPr marL="285750" indent="-285750">
+              <a:buFont typeface="Arial" panose="020B0604020202020204" pitchFamily="34" charset="0"/>
+              <a:buChar char="•"/>
+            </a:pPr>
+            <a:r>
+              <a:rPr lang="nl-NL" sz="2000" dirty="0"/>
+              <a:t>1² + 2² + 3² + 4² + 5² = …</a:t>
+            </a:r>
+            <a:endParaRPr lang="nl-NL" dirty="0"/>
+          </a:p>
+        </p:txBody>
+      </p:sp>
+    </p:spTree>
+    <p:extLst>
+      <p:ext uri="{BB962C8B-B14F-4D97-AF65-F5344CB8AC3E}">
+        <p14:creationId xmlns:p14="http://schemas.microsoft.com/office/powerpoint/2010/main" val="4144951481"/>
+      </p:ext>
+    </p:extLst>
+  </p:cSld>
+  <p:clrMapOvr>
+    <a:masterClrMapping/>
+  </p:clrMapOvr>
+</p:sld>
+</file>
+
+<file path=ppt/slides/slide6.xml><?xml version="1.0" encoding="utf-8"?>
+<p:sld xmlns:a="http://schemas.openxmlformats.org/drawingml/2006/main" xmlns:r="http://schemas.openxmlformats.org/officeDocument/2006/relationships" xmlns:p="http://schemas.openxmlformats.org/presentationml/2006/main">
+  <p:cSld>
+    <p:spTree>
+      <p:nvGrpSpPr>
+        <p:cNvPr id="1" name=""/>
+        <p:cNvGrpSpPr/>
+        <p:nvPr/>
+      </p:nvGrpSpPr>
+      <p:grpSpPr>
+        <a:xfrm>
+          <a:off x="0" y="0"/>
+          <a:ext cx="0" cy="0"/>
+          <a:chOff x="0" y="0"/>
+          <a:chExt cx="0" cy="0"/>
+        </a:xfrm>
+      </p:grpSpPr>
+      <p:sp>
+        <p:nvSpPr>
+          <p:cNvPr id="4" name="Titel 1">
+            <a:extLst>
+              <a:ext uri="{FF2B5EF4-FFF2-40B4-BE49-F238E27FC236}">
+                <a16:creationId xmlns:a16="http://schemas.microsoft.com/office/drawing/2014/main" id="{53F2A67E-F5CD-4C11-A923-966E9932A6D9}"/>
+              </a:ext>
+            </a:extLst>
+          </p:cNvPr>
+          <p:cNvSpPr>
+            <a:spLocks noGrp="1"/>
+          </p:cNvSpPr>
+          <p:nvPr>
+            <p:ph type="title"/>
+          </p:nvPr>
+        </p:nvSpPr>
+        <p:spPr>
+          <a:xfrm>
+            <a:off x="838200" y="365125"/>
+            <a:ext cx="10515600" cy="1325563"/>
+          </a:xfrm>
+        </p:spPr>
+        <p:txBody>
+          <a:bodyPr/>
+          <a:lstStyle/>
+          <a:p>
+            <a:r>
+              <a:rPr lang="en-US" dirty="0">
+                <a:latin typeface="+mj-lt"/>
+              </a:rPr>
+              <a:t>Result</a:t>
+            </a:r>
+          </a:p>
+        </p:txBody>
+      </p:sp>
+      <p:pic>
+        <p:nvPicPr>
+          <p:cNvPr id="1026" name="Picture 2" descr="https://i.gyazo.com/bff10f44571bfdda2970434f16bd6bea.png">
+            <a:extLst>
+              <a:ext uri="{FF2B5EF4-FFF2-40B4-BE49-F238E27FC236}">
+                <a16:creationId xmlns:a16="http://schemas.microsoft.com/office/drawing/2014/main" id="{A8B18A22-07B4-4A3F-8BB7-E3CEE558788F}"/>
+              </a:ext>
+            </a:extLst>
+          </p:cNvPr>
+          <p:cNvPicPr>
+            <a:picLocks noChangeAspect="1" noChangeArrowheads="1"/>
+          </p:cNvPicPr>
+          <p:nvPr/>
+        </p:nvPicPr>
+        <p:blipFill>
+          <a:blip r:embed="rId2">
+            <a:extLst>
+              <a:ext uri="{28A0092B-C50C-407E-A947-70E740481C1C}">
+                <a14:useLocalDpi xmlns:a14="http://schemas.microsoft.com/office/drawing/2010/main" val="0"/>
+              </a:ext>
+            </a:extLst>
+          </a:blip>
+          <a:srcRect/>
+          <a:stretch>
+            <a:fillRect/>
+          </a:stretch>
+        </p:blipFill>
+        <p:spPr bwMode="auto">
+          <a:xfrm>
+            <a:off x="3757612" y="528637"/>
+            <a:ext cx="4676775" cy="5800725"/>
+          </a:xfrm>
+          <a:prstGeom prst="rect">
+            <a:avLst/>
+          </a:prstGeom>
+          <a:noFill/>
+          <a:extLst>
+            <a:ext uri="{909E8E84-426E-40DD-AFC4-6F175D3DCCD1}">
+              <a14:hiddenFill xmlns:a14="http://schemas.microsoft.com/office/drawing/2010/main">
+                <a:solidFill>
+                  <a:srgbClr val="FFFFFF"/>
+                </a:solidFill>
+              </a14:hiddenFill>
+            </a:ext>
+          </a:extLst>
+        </p:spPr>
+      </p:pic>
+    </p:spTree>
+    <p:extLst>
+      <p:ext uri="{BB962C8B-B14F-4D97-AF65-F5344CB8AC3E}">
+        <p14:creationId xmlns:p14="http://schemas.microsoft.com/office/powerpoint/2010/main" val="2901061754"/>
+      </p:ext>
+    </p:extLst>
+  </p:cSld>
+  <p:clrMapOvr>
+    <a:masterClrMapping/>
+  </p:clrMapOvr>
+</p:sld>
+</file>
+
+<file path=ppt/slides/slide7.xml><?xml version="1.0" encoding="utf-8"?>
+<p:sld xmlns:a="http://schemas.openxmlformats.org/drawingml/2006/main" xmlns:r="http://schemas.openxmlformats.org/officeDocument/2006/relationships" xmlns:p="http://schemas.openxmlformats.org/presentationml/2006/main">
+  <p:cSld>
+    <p:spTree>
+      <p:nvGrpSpPr>
+        <p:cNvPr id="1" name=""/>
+        <p:cNvGrpSpPr/>
+        <p:nvPr/>
+      </p:nvGrpSpPr>
+      <p:grpSpPr>
+        <a:xfrm>
+          <a:off x="0" y="0"/>
+          <a:ext cx="0" cy="0"/>
+          <a:chOff x="0" y="0"/>
+          <a:chExt cx="0" cy="0"/>
+        </a:xfrm>
+      </p:grpSpPr>
+      <p:sp>
+        <p:nvSpPr>
+          <p:cNvPr id="4" name="Titel 1">
+            <a:extLst>
+              <a:ext uri="{FF2B5EF4-FFF2-40B4-BE49-F238E27FC236}">
+                <a16:creationId xmlns:a16="http://schemas.microsoft.com/office/drawing/2014/main" id="{30C2F57A-4BCA-45FE-822E-5FB1B396781A}"/>
+              </a:ext>
+            </a:extLst>
+          </p:cNvPr>
+          <p:cNvSpPr>
+            <a:spLocks noGrp="1"/>
+          </p:cNvSpPr>
+          <p:nvPr>
+            <p:ph type="title"/>
+          </p:nvPr>
+        </p:nvSpPr>
+        <p:spPr>
+          <a:xfrm>
+            <a:off x="838200" y="365125"/>
+            <a:ext cx="10515600" cy="1325563"/>
+          </a:xfrm>
+        </p:spPr>
+        <p:txBody>
+          <a:bodyPr/>
+          <a:lstStyle/>
+          <a:p>
+            <a:r>
+              <a:rPr lang="en-US" dirty="0">
+                <a:latin typeface="+mj-lt"/>
+              </a:rPr>
+              <a:t>Example</a:t>
+            </a:r>
+          </a:p>
+        </p:txBody>
+      </p:sp>
+      <p:sp>
+        <p:nvSpPr>
+          <p:cNvPr id="5" name="Tekstvak 4">
+            <a:extLst>
+              <a:ext uri="{FF2B5EF4-FFF2-40B4-BE49-F238E27FC236}">
+                <a16:creationId xmlns:a16="http://schemas.microsoft.com/office/drawing/2014/main" id="{9DD5C73A-E3DB-4FA0-BF47-29F8A550C414}"/>
+              </a:ext>
+            </a:extLst>
+          </p:cNvPr>
+          <p:cNvSpPr txBox="1"/>
+          <p:nvPr/>
+        </p:nvSpPr>
+        <p:spPr>
+          <a:xfrm>
+            <a:off x="2867378" y="2483556"/>
+            <a:ext cx="5480026" cy="646331"/>
+          </a:xfrm>
+          <a:prstGeom prst="rect">
+            <a:avLst/>
+          </a:prstGeom>
+          <a:noFill/>
+        </p:spPr>
+        <p:txBody>
+          <a:bodyPr wrap="none" rtlCol="0">
+            <a:spAutoFit/>
+          </a:bodyPr>
+          <a:lstStyle/>
+          <a:p>
+            <a:r>
+              <a:rPr lang="nl-NL" sz="3600" dirty="0"/>
+              <a:t>How </a:t>
+            </a:r>
+            <a:r>
+              <a:rPr lang="nl-NL" sz="3600" dirty="0" err="1"/>
+              <a:t>could</a:t>
+            </a:r>
+            <a:r>
+              <a:rPr lang="nl-NL" sz="3600" dirty="0"/>
+              <a:t> we </a:t>
+            </a:r>
+            <a:r>
+              <a:rPr lang="nl-NL" sz="3600" dirty="0" err="1"/>
+              <a:t>create</a:t>
+            </a:r>
+            <a:r>
+              <a:rPr lang="nl-NL" sz="3600" dirty="0"/>
+              <a:t> a </a:t>
+            </a:r>
+            <a:r>
+              <a:rPr lang="nl-NL" sz="3600" dirty="0" err="1"/>
+              <a:t>grid</a:t>
+            </a:r>
+            <a:r>
+              <a:rPr lang="nl-NL" sz="3600" dirty="0"/>
+              <a:t>?</a:t>
+            </a:r>
+          </a:p>
+        </p:txBody>
+      </p:sp>
+      <p:pic>
+        <p:nvPicPr>
+          <p:cNvPr id="2052" name="Picture 4" descr="https://i.gyazo.com/473ecfed21cd9f36e59065ea93912118.png">
+            <a:extLst>
+              <a:ext uri="{FF2B5EF4-FFF2-40B4-BE49-F238E27FC236}">
+                <a16:creationId xmlns:a16="http://schemas.microsoft.com/office/drawing/2014/main" id="{46271CDE-B9DD-4592-A60A-0257C68EC3EE}"/>
+              </a:ext>
+            </a:extLst>
+          </p:cNvPr>
+          <p:cNvPicPr>
+            <a:picLocks noChangeAspect="1" noChangeArrowheads="1"/>
+          </p:cNvPicPr>
+          <p:nvPr/>
+        </p:nvPicPr>
+        <p:blipFill>
+          <a:blip r:embed="rId2">
+            <a:extLst>
+              <a:ext uri="{28A0092B-C50C-407E-A947-70E740481C1C}">
+                <a14:useLocalDpi xmlns:a14="http://schemas.microsoft.com/office/drawing/2010/main" val="0"/>
+              </a:ext>
+            </a:extLst>
+          </a:blip>
+          <a:srcRect/>
+          <a:stretch>
+            <a:fillRect/>
+          </a:stretch>
+        </p:blipFill>
+        <p:spPr bwMode="auto">
+          <a:xfrm>
+            <a:off x="5064466" y="3429000"/>
+            <a:ext cx="1085850" cy="2695575"/>
+          </a:xfrm>
+          <a:prstGeom prst="rect">
+            <a:avLst/>
+          </a:prstGeom>
+          <a:noFill/>
+          <a:extLst>
+            <a:ext uri="{909E8E84-426E-40DD-AFC4-6F175D3DCCD1}">
+              <a14:hiddenFill xmlns:a14="http://schemas.microsoft.com/office/drawing/2010/main">
+                <a:solidFill>
+                  <a:srgbClr val="FFFFFF"/>
+                </a:solidFill>
+              </a14:hiddenFill>
+            </a:ext>
+          </a:extLst>
+        </p:spPr>
+      </p:pic>
+    </p:spTree>
+    <p:extLst>
+      <p:ext uri="{BB962C8B-B14F-4D97-AF65-F5344CB8AC3E}">
+        <p14:creationId xmlns:p14="http://schemas.microsoft.com/office/powerpoint/2010/main" val="3941606630"/>
+      </p:ext>
+    </p:extLst>
+  </p:cSld>
+  <p:clrMapOvr>
+    <a:masterClrMapping/>
+  </p:clrMapOvr>
+</p:sld>
+</file>
+
+<file path=ppt/slides/slide8.xml><?xml version="1.0" encoding="utf-8"?>
+<p:sld xmlns:a="http://schemas.openxmlformats.org/drawingml/2006/main" xmlns:r="http://schemas.openxmlformats.org/officeDocument/2006/relationships" xmlns:p="http://schemas.openxmlformats.org/presentationml/2006/main">
+  <p:cSld>
+    <p:spTree>
+      <p:nvGrpSpPr>
+        <p:cNvPr id="1" name=""/>
+        <p:cNvGrpSpPr/>
+        <p:nvPr/>
+      </p:nvGrpSpPr>
+      <p:grpSpPr>
+        <a:xfrm>
+          <a:off x="0" y="0"/>
+          <a:ext cx="0" cy="0"/>
+          <a:chOff x="0" y="0"/>
+          <a:chExt cx="0" cy="0"/>
+        </a:xfrm>
+      </p:grpSpPr>
+      <p:sp>
+        <p:nvSpPr>
+          <p:cNvPr id="4" name="Titel 1">
+            <a:extLst>
+              <a:ext uri="{FF2B5EF4-FFF2-40B4-BE49-F238E27FC236}">
+                <a16:creationId xmlns:a16="http://schemas.microsoft.com/office/drawing/2014/main" id="{30C2F57A-4BCA-45FE-822E-5FB1B396781A}"/>
+              </a:ext>
+            </a:extLst>
+          </p:cNvPr>
+          <p:cNvSpPr>
+            <a:spLocks noGrp="1"/>
+          </p:cNvSpPr>
+          <p:nvPr>
+            <p:ph type="title"/>
+          </p:nvPr>
+        </p:nvSpPr>
+        <p:spPr>
+          <a:xfrm>
+            <a:off x="838200" y="365125"/>
+            <a:ext cx="10515600" cy="1325563"/>
+          </a:xfrm>
+        </p:spPr>
+        <p:txBody>
+          <a:bodyPr/>
+          <a:lstStyle/>
+          <a:p>
+            <a:r>
+              <a:rPr lang="en-US" dirty="0">
+                <a:latin typeface="+mj-lt"/>
+              </a:rPr>
+              <a:t>Example</a:t>
+            </a:r>
+          </a:p>
+        </p:txBody>
+      </p:sp>
+      <p:sp>
+        <p:nvSpPr>
+          <p:cNvPr id="5" name="Tekstvak 4">
+            <a:extLst>
+              <a:ext uri="{FF2B5EF4-FFF2-40B4-BE49-F238E27FC236}">
+                <a16:creationId xmlns:a16="http://schemas.microsoft.com/office/drawing/2014/main" id="{9DD5C73A-E3DB-4FA0-BF47-29F8A550C414}"/>
+              </a:ext>
+            </a:extLst>
+          </p:cNvPr>
+          <p:cNvSpPr txBox="1"/>
+          <p:nvPr/>
+        </p:nvSpPr>
+        <p:spPr>
+          <a:xfrm>
+            <a:off x="2329071" y="1905288"/>
+            <a:ext cx="7533857" cy="646331"/>
+          </a:xfrm>
+          <a:prstGeom prst="rect">
+            <a:avLst/>
+          </a:prstGeom>
+          <a:noFill/>
+        </p:spPr>
+        <p:txBody>
+          <a:bodyPr wrap="none" rtlCol="0">
+            <a:spAutoFit/>
+          </a:bodyPr>
+          <a:lstStyle/>
+          <a:p>
+            <a:r>
+              <a:rPr lang="nl-NL" sz="3600" dirty="0" err="1"/>
+              <a:t>What</a:t>
+            </a:r>
+            <a:r>
+              <a:rPr lang="nl-NL" sz="3600" dirty="0"/>
+              <a:t> do we </a:t>
+            </a:r>
+            <a:r>
+              <a:rPr lang="nl-NL" sz="3600" dirty="0" err="1"/>
+              <a:t>need</a:t>
+            </a:r>
+            <a:r>
+              <a:rPr lang="nl-NL" sz="3600" dirty="0"/>
+              <a:t> </a:t>
+            </a:r>
+            <a:r>
+              <a:rPr lang="nl-NL" sz="3600" dirty="0" err="1"/>
+              <a:t>to</a:t>
+            </a:r>
+            <a:r>
+              <a:rPr lang="nl-NL" sz="3600" dirty="0"/>
+              <a:t> </a:t>
+            </a:r>
+            <a:r>
+              <a:rPr lang="nl-NL" sz="3600" dirty="0" err="1"/>
+              <a:t>use</a:t>
+            </a:r>
+            <a:r>
+              <a:rPr lang="nl-NL" sz="3600" dirty="0"/>
+              <a:t> </a:t>
+            </a:r>
+            <a:r>
+              <a:rPr lang="nl-NL" sz="3600" dirty="0" err="1"/>
+              <a:t>to</a:t>
+            </a:r>
+            <a:r>
+              <a:rPr lang="nl-NL" sz="3600" dirty="0"/>
+              <a:t> </a:t>
+            </a:r>
+            <a:r>
+              <a:rPr lang="nl-NL" sz="3600" dirty="0" err="1"/>
+              <a:t>create</a:t>
+            </a:r>
+            <a:r>
+              <a:rPr lang="nl-NL" sz="3600" dirty="0"/>
+              <a:t> </a:t>
+            </a:r>
+            <a:r>
+              <a:rPr lang="nl-NL" sz="3600" dirty="0" err="1"/>
+              <a:t>this</a:t>
+            </a:r>
+            <a:r>
+              <a:rPr lang="nl-NL" sz="3600" dirty="0"/>
+              <a:t>?</a:t>
+            </a:r>
+          </a:p>
+        </p:txBody>
+      </p:sp>
+      <p:pic>
+        <p:nvPicPr>
+          <p:cNvPr id="2058" name="Picture 10" descr="https://i.gyazo.com/e76da7dd3c72cd7ba60a2acae1718209.png">
+            <a:extLst>
+              <a:ext uri="{FF2B5EF4-FFF2-40B4-BE49-F238E27FC236}">
+                <a16:creationId xmlns:a16="http://schemas.microsoft.com/office/drawing/2014/main" id="{AB2FAEA6-EC75-4CDD-B934-BADC259B5B75}"/>
+              </a:ext>
+            </a:extLst>
+          </p:cNvPr>
+          <p:cNvPicPr>
+            <a:picLocks noChangeAspect="1" noChangeArrowheads="1"/>
+          </p:cNvPicPr>
+          <p:nvPr/>
+        </p:nvPicPr>
+        <p:blipFill>
+          <a:blip r:embed="rId2">
+            <a:extLst>
+              <a:ext uri="{28A0092B-C50C-407E-A947-70E740481C1C}">
+                <a14:useLocalDpi xmlns:a14="http://schemas.microsoft.com/office/drawing/2010/main" val="0"/>
+              </a:ext>
+            </a:extLst>
+          </a:blip>
+          <a:srcRect/>
+          <a:stretch>
+            <a:fillRect/>
+          </a:stretch>
+        </p:blipFill>
+        <p:spPr bwMode="auto">
+          <a:xfrm>
+            <a:off x="8823292" y="3008488"/>
+            <a:ext cx="1152525" cy="3162300"/>
+          </a:xfrm>
+          <a:prstGeom prst="rect">
+            <a:avLst/>
+          </a:prstGeom>
+          <a:noFill/>
+          <a:extLst>
+            <a:ext uri="{909E8E84-426E-40DD-AFC4-6F175D3DCCD1}">
+              <a14:hiddenFill xmlns:a14="http://schemas.microsoft.com/office/drawing/2010/main">
+                <a:solidFill>
+                  <a:srgbClr val="FFFFFF"/>
+                </a:solidFill>
+              </a14:hiddenFill>
+            </a:ext>
+          </a:extLst>
+        </p:spPr>
+      </p:pic>
+      <p:sp>
+        <p:nvSpPr>
+          <p:cNvPr id="2" name="Tekstvak 1">
+            <a:extLst>
+              <a:ext uri="{FF2B5EF4-FFF2-40B4-BE49-F238E27FC236}">
+                <a16:creationId xmlns:a16="http://schemas.microsoft.com/office/drawing/2014/main" id="{5BAE02F6-3144-4D65-BB97-43F9AAF5BA3B}"/>
+              </a:ext>
+            </a:extLst>
+          </p:cNvPr>
+          <p:cNvSpPr txBox="1"/>
+          <p:nvPr/>
+        </p:nvSpPr>
+        <p:spPr>
+          <a:xfrm>
+            <a:off x="838199" y="2921168"/>
+            <a:ext cx="6951133" cy="1015663"/>
+          </a:xfrm>
+          <a:prstGeom prst="rect">
+            <a:avLst/>
+          </a:prstGeom>
+          <a:noFill/>
+        </p:spPr>
+        <p:txBody>
+          <a:bodyPr wrap="square" rtlCol="0">
+            <a:spAutoFit/>
+          </a:bodyPr>
+          <a:lstStyle/>
+          <a:p>
+            <a:pPr marL="285750" indent="-285750">
+              <a:buFont typeface="Arial" panose="020B0604020202020204" pitchFamily="34" charset="0"/>
+              <a:buChar char="•"/>
+            </a:pPr>
+            <a:r>
+              <a:rPr lang="nl-NL" sz="2000" dirty="0"/>
+              <a:t>A user input (</a:t>
+            </a:r>
+            <a:r>
+              <a:rPr lang="nl-NL" sz="2000" dirty="0" err="1"/>
+              <a:t>how</a:t>
+            </a:r>
+            <a:r>
+              <a:rPr lang="nl-NL" sz="2000" dirty="0"/>
+              <a:t> big </a:t>
+            </a:r>
+            <a:r>
+              <a:rPr lang="nl-NL" sz="2000" dirty="0" err="1"/>
+              <a:t>the</a:t>
+            </a:r>
+            <a:r>
+              <a:rPr lang="nl-NL" sz="2000" dirty="0"/>
+              <a:t> </a:t>
+            </a:r>
+            <a:r>
+              <a:rPr lang="nl-NL" sz="2000" dirty="0" err="1"/>
+              <a:t>grid</a:t>
+            </a:r>
+            <a:r>
+              <a:rPr lang="nl-NL" sz="2000" dirty="0"/>
+              <a:t> </a:t>
+            </a:r>
+            <a:r>
+              <a:rPr lang="nl-NL" sz="2000" dirty="0" err="1"/>
+              <a:t>should</a:t>
+            </a:r>
+            <a:r>
+              <a:rPr lang="nl-NL" sz="2000" dirty="0"/>
+              <a:t> </a:t>
+            </a:r>
+            <a:r>
+              <a:rPr lang="nl-NL" sz="2000" dirty="0" err="1"/>
+              <a:t>be</a:t>
+            </a:r>
+            <a:r>
+              <a:rPr lang="nl-NL" sz="2000" dirty="0"/>
+              <a:t>)</a:t>
+            </a:r>
+          </a:p>
+          <a:p>
+            <a:pPr marL="285750" indent="-285750">
+              <a:buFont typeface="Arial" panose="020B0604020202020204" pitchFamily="34" charset="0"/>
+              <a:buChar char="•"/>
+            </a:pPr>
+            <a:r>
+              <a:rPr lang="nl-NL" sz="2000" dirty="0"/>
+              <a:t>A </a:t>
+            </a:r>
+            <a:r>
+              <a:rPr lang="nl-NL" sz="2000" dirty="0" err="1"/>
+              <a:t>function</a:t>
+            </a:r>
+            <a:r>
+              <a:rPr lang="nl-NL" sz="2000" dirty="0"/>
+              <a:t> </a:t>
+            </a:r>
+            <a:r>
+              <a:rPr lang="nl-NL" sz="2000" dirty="0" err="1"/>
+              <a:t>that</a:t>
+            </a:r>
+            <a:r>
+              <a:rPr lang="nl-NL" sz="2000" dirty="0"/>
+              <a:t> prints </a:t>
+            </a:r>
+            <a:r>
+              <a:rPr lang="nl-NL" sz="2000" dirty="0" err="1"/>
+              <a:t>the</a:t>
+            </a:r>
+            <a:r>
+              <a:rPr lang="nl-NL" sz="2000" dirty="0"/>
+              <a:t> </a:t>
+            </a:r>
+            <a:r>
+              <a:rPr lang="nl-NL" sz="2000" dirty="0" err="1"/>
+              <a:t>grid</a:t>
+            </a:r>
+            <a:endParaRPr lang="nl-NL" sz="2000" dirty="0"/>
+          </a:p>
+          <a:p>
+            <a:pPr marL="285750" indent="-285750">
+              <a:buFont typeface="Arial" panose="020B0604020202020204" pitchFamily="34" charset="0"/>
+              <a:buChar char="•"/>
+            </a:pPr>
+            <a:r>
+              <a:rPr lang="nl-NL" sz="2000" dirty="0"/>
+              <a:t>…</a:t>
+            </a:r>
+          </a:p>
+        </p:txBody>
+      </p:sp>
+      <p:pic>
+        <p:nvPicPr>
+          <p:cNvPr id="7" name="Picture 4" descr="https://i.gyazo.com/473ecfed21cd9f36e59065ea93912118.png">
+            <a:extLst>
+              <a:ext uri="{FF2B5EF4-FFF2-40B4-BE49-F238E27FC236}">
+                <a16:creationId xmlns:a16="http://schemas.microsoft.com/office/drawing/2014/main" id="{D4E36325-1984-418B-BA13-A8CD6F253220}"/>
+              </a:ext>
+            </a:extLst>
+          </p:cNvPr>
+          <p:cNvPicPr>
+            <a:picLocks noChangeAspect="1" noChangeArrowheads="1"/>
+          </p:cNvPicPr>
+          <p:nvPr/>
+        </p:nvPicPr>
+        <p:blipFill>
+          <a:blip r:embed="rId3">
+            <a:extLst>
+              <a:ext uri="{28A0092B-C50C-407E-A947-70E740481C1C}">
+                <a14:useLocalDpi xmlns:a14="http://schemas.microsoft.com/office/drawing/2010/main" val="0"/>
+              </a:ext>
+            </a:extLst>
+          </a:blip>
+          <a:srcRect/>
+          <a:stretch>
+            <a:fillRect/>
+          </a:stretch>
+        </p:blipFill>
+        <p:spPr bwMode="auto">
+          <a:xfrm>
+            <a:off x="7246407" y="3008488"/>
+            <a:ext cx="1085850" cy="2695575"/>
+          </a:xfrm>
+          <a:prstGeom prst="rect">
+            <a:avLst/>
+          </a:prstGeom>
+          <a:noFill/>
+          <a:extLst>
+            <a:ext uri="{909E8E84-426E-40DD-AFC4-6F175D3DCCD1}">
+              <a14:hiddenFill xmlns:a14="http://schemas.microsoft.com/office/drawing/2010/main">
+                <a:solidFill>
+                  <a:srgbClr val="FFFFFF"/>
+                </a:solidFill>
+              </a14:hiddenFill>
+            </a:ext>
+          </a:extLst>
+        </p:spPr>
+      </p:pic>
+    </p:spTree>
+    <p:extLst>
+      <p:ext uri="{BB962C8B-B14F-4D97-AF65-F5344CB8AC3E}">
+        <p14:creationId xmlns:p14="http://schemas.microsoft.com/office/powerpoint/2010/main" val="3322257441"/>
+      </p:ext>
+    </p:extLst>
+  </p:cSld>
+  <p:clrMapOvr>
+    <a:masterClrMapping/>
+  </p:clrMapOvr>
+</p:sld>
+</file>
+
+<file path=ppt/slides/slide9.xml><?xml version="1.0" encoding="utf-8"?>
+<p:sld xmlns:a="http://schemas.openxmlformats.org/drawingml/2006/main" xmlns:r="http://schemas.openxmlformats.org/officeDocument/2006/relationships" xmlns:p="http://schemas.openxmlformats.org/presentationml/2006/main">
+  <p:cSld>
+    <p:spTree>
+      <p:nvGrpSpPr>
+        <p:cNvPr id="1" name=""/>
+        <p:cNvGrpSpPr/>
+        <p:nvPr/>
+      </p:nvGrpSpPr>
+      <p:grpSpPr>
+        <a:xfrm>
+          <a:off x="0" y="0"/>
+          <a:ext cx="0" cy="0"/>
+          <a:chOff x="0" y="0"/>
+          <a:chExt cx="0" cy="0"/>
+        </a:xfrm>
+      </p:grpSpPr>
+      <p:sp>
+        <p:nvSpPr>
+          <p:cNvPr id="4" name="Titel 1">
+            <a:extLst>
+              <a:ext uri="{FF2B5EF4-FFF2-40B4-BE49-F238E27FC236}">
+                <a16:creationId xmlns:a16="http://schemas.microsoft.com/office/drawing/2014/main" id="{2D6A7856-6C6B-4732-A836-E20DA09F1F74}"/>
+              </a:ext>
+            </a:extLst>
+          </p:cNvPr>
+          <p:cNvSpPr>
+            <a:spLocks noGrp="1"/>
+          </p:cNvSpPr>
+          <p:nvPr>
+            <p:ph type="title"/>
+          </p:nvPr>
+        </p:nvSpPr>
+        <p:spPr>
+          <a:xfrm>
+            <a:off x="838200" y="365125"/>
+            <a:ext cx="10515600" cy="1325563"/>
+          </a:xfrm>
+        </p:spPr>
+        <p:txBody>
+          <a:bodyPr/>
+          <a:lstStyle/>
+          <a:p>
+            <a:r>
+              <a:rPr lang="en-US" dirty="0">
+                <a:latin typeface="+mj-lt"/>
+              </a:rPr>
+              <a:t>Exercise create a grid (20 min)</a:t>
+            </a:r>
+          </a:p>
+        </p:txBody>
+      </p:sp>
+      <p:sp>
+        <p:nvSpPr>
+          <p:cNvPr id="6" name="Tekstvak 5">
+            <a:extLst>
+              <a:ext uri="{FF2B5EF4-FFF2-40B4-BE49-F238E27FC236}">
+                <a16:creationId xmlns:a16="http://schemas.microsoft.com/office/drawing/2014/main" id="{966CFB75-017D-4AC0-9266-6168DD1F956C}"/>
+              </a:ext>
+            </a:extLst>
+          </p:cNvPr>
+          <p:cNvSpPr txBox="1"/>
+          <p:nvPr/>
+        </p:nvSpPr>
+        <p:spPr>
+          <a:xfrm>
+            <a:off x="838200" y="2130946"/>
+            <a:ext cx="6951133" cy="1015663"/>
+          </a:xfrm>
+          <a:prstGeom prst="rect">
+            <a:avLst/>
+          </a:prstGeom>
+          <a:noFill/>
+        </p:spPr>
+        <p:txBody>
+          <a:bodyPr wrap="square" rtlCol="0">
+            <a:spAutoFit/>
+          </a:bodyPr>
+          <a:lstStyle/>
+          <a:p>
+            <a:pPr marL="285750" indent="-285750">
+              <a:buFont typeface="Arial" panose="020B0604020202020204" pitchFamily="34" charset="0"/>
+              <a:buChar char="•"/>
+            </a:pPr>
+            <a:r>
+              <a:rPr lang="nl-NL" sz="2000" dirty="0"/>
+              <a:t>A user input (</a:t>
+            </a:r>
+            <a:r>
+              <a:rPr lang="nl-NL" sz="2000" dirty="0" err="1"/>
+              <a:t>how</a:t>
+            </a:r>
+            <a:r>
+              <a:rPr lang="nl-NL" sz="2000" dirty="0"/>
+              <a:t> big </a:t>
+            </a:r>
+            <a:r>
+              <a:rPr lang="nl-NL" sz="2000" dirty="0" err="1"/>
+              <a:t>the</a:t>
+            </a:r>
+            <a:r>
+              <a:rPr lang="nl-NL" sz="2000" dirty="0"/>
+              <a:t> </a:t>
+            </a:r>
+            <a:r>
+              <a:rPr lang="nl-NL" sz="2000" dirty="0" err="1"/>
+              <a:t>grid</a:t>
+            </a:r>
+            <a:r>
+              <a:rPr lang="nl-NL" sz="2000" dirty="0"/>
+              <a:t> </a:t>
+            </a:r>
+            <a:r>
+              <a:rPr lang="nl-NL" sz="2000" dirty="0" err="1"/>
+              <a:t>should</a:t>
+            </a:r>
+            <a:r>
+              <a:rPr lang="nl-NL" sz="2000" dirty="0"/>
+              <a:t> </a:t>
+            </a:r>
+            <a:r>
+              <a:rPr lang="nl-NL" sz="2000" dirty="0" err="1"/>
+              <a:t>be</a:t>
+            </a:r>
+            <a:r>
+              <a:rPr lang="nl-NL" sz="2000" dirty="0"/>
+              <a:t>)</a:t>
+            </a:r>
+          </a:p>
+          <a:p>
+            <a:pPr marL="285750" indent="-285750">
+              <a:buFont typeface="Arial" panose="020B0604020202020204" pitchFamily="34" charset="0"/>
+              <a:buChar char="•"/>
+            </a:pPr>
+            <a:r>
+              <a:rPr lang="nl-NL" sz="2000" dirty="0"/>
+              <a:t>A </a:t>
+            </a:r>
+            <a:r>
+              <a:rPr lang="nl-NL" sz="2000" dirty="0" err="1"/>
+              <a:t>function</a:t>
+            </a:r>
+            <a:r>
+              <a:rPr lang="nl-NL" sz="2000" dirty="0"/>
+              <a:t> </a:t>
+            </a:r>
+            <a:r>
+              <a:rPr lang="nl-NL" sz="2000" dirty="0" err="1"/>
+              <a:t>that</a:t>
+            </a:r>
+            <a:r>
+              <a:rPr lang="nl-NL" sz="2000" dirty="0"/>
+              <a:t> prints </a:t>
+            </a:r>
+            <a:r>
+              <a:rPr lang="nl-NL" sz="2000" dirty="0" err="1"/>
+              <a:t>the</a:t>
+            </a:r>
+            <a:r>
+              <a:rPr lang="nl-NL" sz="2000" dirty="0"/>
+              <a:t> </a:t>
+            </a:r>
+            <a:r>
+              <a:rPr lang="nl-NL" sz="2000" dirty="0" err="1"/>
+              <a:t>grid</a:t>
+            </a:r>
+            <a:endParaRPr lang="nl-NL" sz="2000" dirty="0"/>
+          </a:p>
+          <a:p>
+            <a:pPr marL="285750" indent="-285750">
+              <a:buFont typeface="Arial" panose="020B0604020202020204" pitchFamily="34" charset="0"/>
+              <a:buChar char="•"/>
+            </a:pPr>
+            <a:r>
+              <a:rPr lang="nl-NL" sz="2000" dirty="0"/>
+              <a:t>…</a:t>
+            </a:r>
+          </a:p>
+        </p:txBody>
+      </p:sp>
+      <p:pic>
+        <p:nvPicPr>
+          <p:cNvPr id="7" name="Picture 10" descr="https://i.gyazo.com/e76da7dd3c72cd7ba60a2acae1718209.png">
+            <a:extLst>
+              <a:ext uri="{FF2B5EF4-FFF2-40B4-BE49-F238E27FC236}">
+                <a16:creationId xmlns:a16="http://schemas.microsoft.com/office/drawing/2014/main" id="{1A582321-6070-4B94-BCC9-78D172F7F832}"/>
+              </a:ext>
+            </a:extLst>
+          </p:cNvPr>
+          <p:cNvPicPr>
+            <a:picLocks noChangeAspect="1" noChangeArrowheads="1"/>
+          </p:cNvPicPr>
+          <p:nvPr/>
+        </p:nvPicPr>
+        <p:blipFill>
+          <a:blip r:embed="rId2">
+            <a:extLst>
+              <a:ext uri="{28A0092B-C50C-407E-A947-70E740481C1C}">
+                <a14:useLocalDpi xmlns:a14="http://schemas.microsoft.com/office/drawing/2010/main" val="0"/>
+              </a:ext>
+            </a:extLst>
+          </a:blip>
+          <a:srcRect/>
+          <a:stretch>
+            <a:fillRect/>
+          </a:stretch>
+        </p:blipFill>
+        <p:spPr bwMode="auto">
+          <a:xfrm>
+            <a:off x="9060359" y="2130946"/>
+            <a:ext cx="1152525" cy="3162300"/>
+          </a:xfrm>
+          <a:prstGeom prst="rect">
+            <a:avLst/>
+          </a:prstGeom>
+          <a:noFill/>
+          <a:extLst>
+            <a:ext uri="{909E8E84-426E-40DD-AFC4-6F175D3DCCD1}">
+              <a14:hiddenFill xmlns:a14="http://schemas.microsoft.com/office/drawing/2010/main">
+                <a:solidFill>
+                  <a:srgbClr val="FFFFFF"/>
+                </a:solidFill>
+              </a14:hiddenFill>
+            </a:ext>
+          </a:extLst>
+        </p:spPr>
+      </p:pic>
+      <p:pic>
+        <p:nvPicPr>
+          <p:cNvPr id="8" name="Picture 4" descr="https://i.gyazo.com/473ecfed21cd9f36e59065ea93912118.png">
+            <a:extLst>
+              <a:ext uri="{FF2B5EF4-FFF2-40B4-BE49-F238E27FC236}">
+                <a16:creationId xmlns:a16="http://schemas.microsoft.com/office/drawing/2014/main" id="{E33CD8B9-1405-488C-93C7-CA3FD0D74564}"/>
+              </a:ext>
+            </a:extLst>
+          </p:cNvPr>
+          <p:cNvPicPr>
+            <a:picLocks noChangeAspect="1" noChangeArrowheads="1"/>
+          </p:cNvPicPr>
+          <p:nvPr/>
+        </p:nvPicPr>
+        <p:blipFill>
+          <a:blip r:embed="rId3">
+            <a:extLst>
+              <a:ext uri="{28A0092B-C50C-407E-A947-70E740481C1C}">
+                <a14:useLocalDpi xmlns:a14="http://schemas.microsoft.com/office/drawing/2010/main" val="0"/>
+              </a:ext>
+            </a:extLst>
+          </a:blip>
+          <a:srcRect/>
+          <a:stretch>
+            <a:fillRect/>
+          </a:stretch>
+        </p:blipFill>
+        <p:spPr bwMode="auto">
+          <a:xfrm>
+            <a:off x="7483474" y="2130946"/>
+            <a:ext cx="1085850" cy="2695575"/>
+          </a:xfrm>
+          <a:prstGeom prst="rect">
+            <a:avLst/>
+          </a:prstGeom>
+          <a:noFill/>
+          <a:extLst>
+            <a:ext uri="{909E8E84-426E-40DD-AFC4-6F175D3DCCD1}">
+              <a14:hiddenFill xmlns:a14="http://schemas.microsoft.com/office/drawing/2010/main">
+                <a:solidFill>
+                  <a:srgbClr val="FFFFFF"/>
+                </a:solidFill>
+              </a14:hiddenFill>
+            </a:ext>
+          </a:extLst>
+        </p:spPr>
+      </p:pic>
+    </p:spTree>
+    <p:extLst>
+      <p:ext uri="{BB962C8B-B14F-4D97-AF65-F5344CB8AC3E}">
+        <p14:creationId xmlns:p14="http://schemas.microsoft.com/office/powerpoint/2010/main" val="3855523793"/>
       </p:ext>
     </p:extLst>
   </p:cSld>

</xml_diff>

<commit_message>
map added to slides
</commit_message>
<xml_diff>
--- a/Lessons/Jaar 2/Lesson 3/Lesson 3.pptx
+++ b/Lessons/Jaar 2/Lesson 3/Lesson 3.pptx
@@ -16,9 +16,11 @@
     <p:sldId id="294" r:id="rId10"/>
     <p:sldId id="296" r:id="rId11"/>
     <p:sldId id="295" r:id="rId12"/>
-    <p:sldId id="297" r:id="rId13"/>
-    <p:sldId id="298" r:id="rId14"/>
-    <p:sldId id="288" r:id="rId15"/>
+    <p:sldId id="299" r:id="rId13"/>
+    <p:sldId id="300" r:id="rId14"/>
+    <p:sldId id="301" r:id="rId15"/>
+    <p:sldId id="302" r:id="rId16"/>
+    <p:sldId id="288" r:id="rId17"/>
   </p:sldIdLst>
   <p:sldSz cx="12192000" cy="6858000"/>
   <p:notesSz cx="6858000" cy="9144000"/>
@@ -3888,7 +3890,7 @@
           <p:cNvPr id="4" name="Titel 1">
             <a:extLst>
               <a:ext uri="{FF2B5EF4-FFF2-40B4-BE49-F238E27FC236}">
-                <a16:creationId xmlns:a16="http://schemas.microsoft.com/office/drawing/2014/main" id="{8C2BEA05-40D9-4B1C-A4F6-0CAFF127BA83}"/>
+                <a16:creationId xmlns:a16="http://schemas.microsoft.com/office/drawing/2014/main" id="{E52AEF54-0576-4AF3-ACD1-880621926224}"/>
               </a:ext>
             </a:extLst>
           </p:cNvPr>
@@ -3901,29 +3903,178 @@
         </p:nvSpPr>
         <p:spPr>
           <a:xfrm>
-            <a:off x="838200" y="2766218"/>
+            <a:off x="838200" y="365125"/>
             <a:ext cx="10515600" cy="1325563"/>
           </a:xfrm>
         </p:spPr>
         <p:txBody>
-          <a:bodyPr>
-            <a:normAutofit/>
+          <a:bodyPr/>
+          <a:lstStyle/>
+          <a:p>
+            <a:r>
+              <a:rPr lang="en-US">
+                <a:latin typeface="+mj-lt"/>
+              </a:rPr>
+              <a:t>Example map</a:t>
+            </a:r>
+            <a:endParaRPr lang="en-US" dirty="0">
+              <a:latin typeface="+mj-lt"/>
+            </a:endParaRPr>
+          </a:p>
+        </p:txBody>
+      </p:sp>
+      <p:sp>
+        <p:nvSpPr>
+          <p:cNvPr id="2" name="Tekstvak 1">
+            <a:extLst>
+              <a:ext uri="{FF2B5EF4-FFF2-40B4-BE49-F238E27FC236}">
+                <a16:creationId xmlns:a16="http://schemas.microsoft.com/office/drawing/2014/main" id="{6E8A53C7-72D8-48D9-8B6E-75FBF890A883}"/>
+              </a:ext>
+            </a:extLst>
+          </p:cNvPr>
+          <p:cNvSpPr txBox="1"/>
+          <p:nvPr/>
+        </p:nvSpPr>
+        <p:spPr>
+          <a:xfrm>
+            <a:off x="970844" y="2235200"/>
+            <a:ext cx="8703734" cy="1384995"/>
+          </a:xfrm>
+          <a:prstGeom prst="rect">
+            <a:avLst/>
+          </a:prstGeom>
+          <a:noFill/>
+        </p:spPr>
+        <p:txBody>
+          <a:bodyPr wrap="square" rtlCol="0">
+            <a:spAutoFit/>
           </a:bodyPr>
           <a:lstStyle/>
           <a:p>
             <a:r>
-              <a:rPr lang="en-US" sz="4000" dirty="0">
-                <a:latin typeface="+mj-lt"/>
-              </a:rPr>
-              <a:t>What would you want to see in the next lessons?</a:t>
-            </a:r>
-          </a:p>
-        </p:txBody>
-      </p:sp>
+              <a:rPr lang="nl-NL" sz="2800" dirty="0" err="1"/>
+              <a:t>What</a:t>
+            </a:r>
+            <a:r>
+              <a:rPr lang="nl-NL" sz="2800" dirty="0"/>
+              <a:t> is a Map </a:t>
+            </a:r>
+            <a:r>
+              <a:rPr lang="nl-NL" sz="2800" dirty="0" err="1"/>
+              <a:t>function</a:t>
+            </a:r>
+            <a:r>
+              <a:rPr lang="nl-NL" sz="2800" dirty="0"/>
+              <a:t>?</a:t>
+            </a:r>
+          </a:p>
+          <a:p>
+            <a:pPr marL="457200" indent="-457200">
+              <a:buFont typeface="Arial" panose="020B0604020202020204" pitchFamily="34" charset="0"/>
+              <a:buChar char="•"/>
+            </a:pPr>
+            <a:r>
+              <a:rPr lang="nl-NL" sz="2800" dirty="0" err="1"/>
+              <a:t>Similair</a:t>
+            </a:r>
+            <a:r>
+              <a:rPr lang="nl-NL" sz="2800" dirty="0"/>
+              <a:t> </a:t>
+            </a:r>
+            <a:r>
+              <a:rPr lang="nl-NL" sz="2800" dirty="0" err="1"/>
+              <a:t>to</a:t>
+            </a:r>
+            <a:r>
+              <a:rPr lang="nl-NL" sz="2800" dirty="0"/>
+              <a:t> </a:t>
+            </a:r>
+            <a:r>
+              <a:rPr lang="nl-NL" sz="2800" dirty="0" err="1"/>
+              <a:t>foreach</a:t>
+            </a:r>
+            <a:endParaRPr lang="nl-NL" sz="2800" dirty="0"/>
+          </a:p>
+          <a:p>
+            <a:pPr marL="457200" indent="-457200">
+              <a:buFont typeface="Arial" panose="020B0604020202020204" pitchFamily="34" charset="0"/>
+              <a:buChar char="•"/>
+            </a:pPr>
+            <a:r>
+              <a:rPr lang="nl-NL" sz="2800" dirty="0" err="1"/>
+              <a:t>Implemented</a:t>
+            </a:r>
+            <a:r>
+              <a:rPr lang="nl-NL" sz="2800" dirty="0"/>
+              <a:t> </a:t>
+            </a:r>
+            <a:r>
+              <a:rPr lang="nl-NL" sz="2800" dirty="0" err="1"/>
+              <a:t>function</a:t>
+            </a:r>
+            <a:r>
+              <a:rPr lang="nl-NL" sz="2800" dirty="0"/>
+              <a:t> in most </a:t>
+            </a:r>
+            <a:r>
+              <a:rPr lang="nl-NL" sz="2800" dirty="0" err="1"/>
+              <a:t>languages</a:t>
+            </a:r>
+            <a:endParaRPr lang="nl-NL" sz="2800" dirty="0"/>
+          </a:p>
+        </p:txBody>
+      </p:sp>
+      <p:pic>
+        <p:nvPicPr>
+          <p:cNvPr id="1026" name="Picture 2" descr="https://i.gyazo.com/ea7a40a23703c1a754da43535c18079c.png">
+            <a:extLst>
+              <a:ext uri="{FF2B5EF4-FFF2-40B4-BE49-F238E27FC236}">
+                <a16:creationId xmlns:a16="http://schemas.microsoft.com/office/drawing/2014/main" id="{AC463121-F496-4522-A74E-9C1F83D2E56F}"/>
+              </a:ext>
+            </a:extLst>
+          </p:cNvPr>
+          <p:cNvPicPr>
+            <a:picLocks noChangeAspect="1" noChangeArrowheads="1"/>
+          </p:cNvPicPr>
+          <p:nvPr/>
+        </p:nvPicPr>
+        <p:blipFill>
+          <a:blip r:embed="rId2">
+            <a:extLst>
+              <a:ext uri="{28A0092B-C50C-407E-A947-70E740481C1C}">
+                <a14:useLocalDpi xmlns:a14="http://schemas.microsoft.com/office/drawing/2010/main" val="0"/>
+              </a:ext>
+            </a:extLst>
+          </a:blip>
+          <a:srcRect/>
+          <a:stretch>
+            <a:fillRect/>
+          </a:stretch>
+        </p:blipFill>
+        <p:spPr bwMode="auto">
+          <a:xfrm>
+            <a:off x="970844" y="3979515"/>
+            <a:ext cx="4098319" cy="2346489"/>
+          </a:xfrm>
+          <a:prstGeom prst="rect">
+            <a:avLst/>
+          </a:prstGeom>
+          <a:noFill/>
+          <a:extLst>
+            <a:ext uri="{909E8E84-426E-40DD-AFC4-6F175D3DCCD1}">
+              <a14:hiddenFill xmlns:a14="http://schemas.microsoft.com/office/drawing/2010/main">
+                <a:solidFill>
+                  <a:srgbClr val="FFFFFF"/>
+                </a:solidFill>
+              </a14:hiddenFill>
+            </a:ext>
+          </a:extLst>
+        </p:spPr>
+      </p:pic>
     </p:spTree>
     <p:extLst>
       <p:ext uri="{BB962C8B-B14F-4D97-AF65-F5344CB8AC3E}">
-        <p14:creationId xmlns:p14="http://schemas.microsoft.com/office/powerpoint/2010/main" val="2876781796"/>
+        <p14:creationId xmlns:p14="http://schemas.microsoft.com/office/powerpoint/2010/main" val="2094449779"/>
       </p:ext>
     </p:extLst>
   </p:cSld>
@@ -3952,10 +4103,48 @@
       </p:grpSpPr>
       <p:sp>
         <p:nvSpPr>
-          <p:cNvPr id="4" name="Tekstvak 3">
-            <a:extLst>
-              <a:ext uri="{FF2B5EF4-FFF2-40B4-BE49-F238E27FC236}">
-                <a16:creationId xmlns:a16="http://schemas.microsoft.com/office/drawing/2014/main" id="{723004F0-9876-46A2-A2CB-10BEB1A4F652}"/>
+          <p:cNvPr id="4" name="Titel 1">
+            <a:extLst>
+              <a:ext uri="{FF2B5EF4-FFF2-40B4-BE49-F238E27FC236}">
+                <a16:creationId xmlns:a16="http://schemas.microsoft.com/office/drawing/2014/main" id="{E52AEF54-0576-4AF3-ACD1-880621926224}"/>
+              </a:ext>
+            </a:extLst>
+          </p:cNvPr>
+          <p:cNvSpPr>
+            <a:spLocks noGrp="1"/>
+          </p:cNvSpPr>
+          <p:nvPr>
+            <p:ph type="title"/>
+          </p:nvPr>
+        </p:nvSpPr>
+        <p:spPr>
+          <a:xfrm>
+            <a:off x="838200" y="365125"/>
+            <a:ext cx="10515600" cy="1325563"/>
+          </a:xfrm>
+        </p:spPr>
+        <p:txBody>
+          <a:bodyPr/>
+          <a:lstStyle/>
+          <a:p>
+            <a:r>
+              <a:rPr lang="en-US">
+                <a:latin typeface="+mj-lt"/>
+              </a:rPr>
+              <a:t>Example map</a:t>
+            </a:r>
+            <a:endParaRPr lang="en-US" dirty="0">
+              <a:latin typeface="+mj-lt"/>
+            </a:endParaRPr>
+          </a:p>
+        </p:txBody>
+      </p:sp>
+      <p:sp>
+        <p:nvSpPr>
+          <p:cNvPr id="2" name="Tekstvak 1">
+            <a:extLst>
+              <a:ext uri="{FF2B5EF4-FFF2-40B4-BE49-F238E27FC236}">
+                <a16:creationId xmlns:a16="http://schemas.microsoft.com/office/drawing/2014/main" id="{6E8A53C7-72D8-48D9-8B6E-75FBF890A883}"/>
               </a:ext>
             </a:extLst>
           </p:cNvPr>
@@ -3964,8 +4153,8 @@
         </p:nvSpPr>
         <p:spPr>
           <a:xfrm>
-            <a:off x="2444045" y="2721114"/>
-            <a:ext cx="7303910" cy="707886"/>
+            <a:off x="970844" y="2235200"/>
+            <a:ext cx="8703734" cy="1384995"/>
           </a:xfrm>
           <a:prstGeom prst="rect">
             <a:avLst/>
@@ -3979,42 +4168,176 @@
           <a:lstStyle/>
           <a:p>
             <a:r>
-              <a:rPr lang="nl-NL" sz="4000" dirty="0">
-                <a:latin typeface="+mj-lt"/>
-              </a:rPr>
-              <a:t>My </a:t>
-            </a:r>
-            <a:r>
-              <a:rPr lang="nl-NL" sz="4000" dirty="0" err="1">
-                <a:latin typeface="+mj-lt"/>
-              </a:rPr>
-              <a:t>experiences</a:t>
-            </a:r>
-            <a:r>
-              <a:rPr lang="nl-NL" sz="4000" dirty="0">
-                <a:latin typeface="+mj-lt"/>
-              </a:rPr>
+              <a:rPr lang="nl-NL" sz="2800" dirty="0" err="1"/>
+              <a:t>What</a:t>
+            </a:r>
+            <a:r>
+              <a:rPr lang="nl-NL" sz="2800" dirty="0"/>
+              <a:t> is a Map </a:t>
+            </a:r>
+            <a:r>
+              <a:rPr lang="nl-NL" sz="2800" dirty="0" err="1"/>
+              <a:t>function</a:t>
+            </a:r>
+            <a:r>
+              <a:rPr lang="nl-NL" sz="2800" dirty="0"/>
+              <a:t>?</a:t>
+            </a:r>
+          </a:p>
+          <a:p>
+            <a:pPr marL="457200" indent="-457200">
+              <a:buFont typeface="Arial" panose="020B0604020202020204" pitchFamily="34" charset="0"/>
+              <a:buChar char="•"/>
+            </a:pPr>
+            <a:r>
+              <a:rPr lang="nl-NL" sz="2800" dirty="0" err="1"/>
+              <a:t>Similair</a:t>
+            </a:r>
+            <a:r>
+              <a:rPr lang="nl-NL" sz="2800" dirty="0"/>
               <a:t> </a:t>
             </a:r>
             <a:r>
-              <a:rPr lang="nl-NL" sz="4000" dirty="0" err="1">
-                <a:latin typeface="+mj-lt"/>
-              </a:rPr>
-              <a:t>and</a:t>
-            </a:r>
-            <a:r>
-              <a:rPr lang="nl-NL" sz="4000" dirty="0">
-                <a:latin typeface="+mj-lt"/>
-              </a:rPr>
-              <a:t> expertise?</a:t>
-            </a:r>
-          </a:p>
-        </p:txBody>
-      </p:sp>
+              <a:rPr lang="nl-NL" sz="2800" dirty="0" err="1"/>
+              <a:t>to</a:t>
+            </a:r>
+            <a:r>
+              <a:rPr lang="nl-NL" sz="2800" dirty="0"/>
+              <a:t> </a:t>
+            </a:r>
+            <a:r>
+              <a:rPr lang="nl-NL" sz="2800" dirty="0" err="1"/>
+              <a:t>foreach</a:t>
+            </a:r>
+            <a:endParaRPr lang="nl-NL" sz="2800" dirty="0"/>
+          </a:p>
+          <a:p>
+            <a:pPr marL="457200" indent="-457200">
+              <a:buFont typeface="Arial" panose="020B0604020202020204" pitchFamily="34" charset="0"/>
+              <a:buChar char="•"/>
+            </a:pPr>
+            <a:r>
+              <a:rPr lang="nl-NL" sz="2800" dirty="0" err="1"/>
+              <a:t>Implemented</a:t>
+            </a:r>
+            <a:r>
+              <a:rPr lang="nl-NL" sz="2800" dirty="0"/>
+              <a:t> </a:t>
+            </a:r>
+            <a:r>
+              <a:rPr lang="nl-NL" sz="2800" dirty="0" err="1"/>
+              <a:t>function</a:t>
+            </a:r>
+            <a:r>
+              <a:rPr lang="nl-NL" sz="2800" dirty="0"/>
+              <a:t> in most </a:t>
+            </a:r>
+            <a:r>
+              <a:rPr lang="nl-NL" sz="2800" dirty="0" err="1"/>
+              <a:t>languages</a:t>
+            </a:r>
+            <a:endParaRPr lang="nl-NL" sz="2800" dirty="0"/>
+          </a:p>
+        </p:txBody>
+      </p:sp>
+      <p:pic>
+        <p:nvPicPr>
+          <p:cNvPr id="2050" name="Picture 2" descr="https://i.gyazo.com/fcdc35a608a98cdc403ffdc923c1df25.png">
+            <a:extLst>
+              <a:ext uri="{FF2B5EF4-FFF2-40B4-BE49-F238E27FC236}">
+                <a16:creationId xmlns:a16="http://schemas.microsoft.com/office/drawing/2014/main" id="{6B380EC1-A3F8-49B9-BCDB-4F97717B8A8A}"/>
+              </a:ext>
+            </a:extLst>
+          </p:cNvPr>
+          <p:cNvPicPr>
+            <a:picLocks noChangeAspect="1" noChangeArrowheads="1"/>
+          </p:cNvPicPr>
+          <p:nvPr/>
+        </p:nvPicPr>
+        <p:blipFill>
+          <a:blip r:embed="rId2">
+            <a:extLst>
+              <a:ext uri="{28A0092B-C50C-407E-A947-70E740481C1C}">
+                <a14:useLocalDpi xmlns:a14="http://schemas.microsoft.com/office/drawing/2010/main" val="0"/>
+              </a:ext>
+            </a:extLst>
+          </a:blip>
+          <a:srcRect/>
+          <a:stretch>
+            <a:fillRect/>
+          </a:stretch>
+        </p:blipFill>
+        <p:spPr bwMode="auto">
+          <a:xfrm>
+            <a:off x="5236889" y="3620195"/>
+            <a:ext cx="3771900" cy="3009900"/>
+          </a:xfrm>
+          <a:prstGeom prst="rect">
+            <a:avLst/>
+          </a:prstGeom>
+          <a:noFill/>
+          <a:extLst>
+            <a:ext uri="{909E8E84-426E-40DD-AFC4-6F175D3DCCD1}">
+              <a14:hiddenFill xmlns:a14="http://schemas.microsoft.com/office/drawing/2010/main">
+                <a:solidFill>
+                  <a:srgbClr val="FFFFFF"/>
+                </a:solidFill>
+              </a14:hiddenFill>
+            </a:ext>
+          </a:extLst>
+        </p:spPr>
+      </p:pic>
+      <p:pic>
+        <p:nvPicPr>
+          <p:cNvPr id="6" name="Picture 2" descr="https://i.gyazo.com/ea7a40a23703c1a754da43535c18079c.png">
+            <a:extLst>
+              <a:ext uri="{FF2B5EF4-FFF2-40B4-BE49-F238E27FC236}">
+                <a16:creationId xmlns:a16="http://schemas.microsoft.com/office/drawing/2014/main" id="{595DB5E8-F465-4A8F-9DE1-E999B09418C8}"/>
+              </a:ext>
+            </a:extLst>
+          </p:cNvPr>
+          <p:cNvPicPr>
+            <a:picLocks noChangeAspect="1" noChangeArrowheads="1"/>
+          </p:cNvPicPr>
+          <p:nvPr/>
+        </p:nvPicPr>
+        <p:blipFill>
+          <a:blip r:embed="rId3">
+            <a:extLst>
+              <a:ext uri="{28A0092B-C50C-407E-A947-70E740481C1C}">
+                <a14:useLocalDpi xmlns:a14="http://schemas.microsoft.com/office/drawing/2010/main" val="0"/>
+              </a:ext>
+            </a:extLst>
+          </a:blip>
+          <a:srcRect/>
+          <a:stretch>
+            <a:fillRect/>
+          </a:stretch>
+        </p:blipFill>
+        <p:spPr bwMode="auto">
+          <a:xfrm>
+            <a:off x="970844" y="3979515"/>
+            <a:ext cx="4098319" cy="2346489"/>
+          </a:xfrm>
+          <a:prstGeom prst="rect">
+            <a:avLst/>
+          </a:prstGeom>
+          <a:noFill/>
+          <a:extLst>
+            <a:ext uri="{909E8E84-426E-40DD-AFC4-6F175D3DCCD1}">
+              <a14:hiddenFill xmlns:a14="http://schemas.microsoft.com/office/drawing/2010/main">
+                <a:solidFill>
+                  <a:srgbClr val="FFFFFF"/>
+                </a:solidFill>
+              </a14:hiddenFill>
+            </a:ext>
+          </a:extLst>
+        </p:spPr>
+      </p:pic>
     </p:spTree>
     <p:extLst>
       <p:ext uri="{BB962C8B-B14F-4D97-AF65-F5344CB8AC3E}">
-        <p14:creationId xmlns:p14="http://schemas.microsoft.com/office/powerpoint/2010/main" val="2432032485"/>
+        <p14:creationId xmlns:p14="http://schemas.microsoft.com/office/powerpoint/2010/main" val="4227718610"/>
       </p:ext>
     </p:extLst>
   </p:cSld>
@@ -4025,6 +4348,330 @@
 </file>
 
 <file path=ppt/slides/slide14.xml><?xml version="1.0" encoding="utf-8"?>
+<p:sld xmlns:a="http://schemas.openxmlformats.org/drawingml/2006/main" xmlns:r="http://schemas.openxmlformats.org/officeDocument/2006/relationships" xmlns:p="http://schemas.openxmlformats.org/presentationml/2006/main">
+  <p:cSld>
+    <p:spTree>
+      <p:nvGrpSpPr>
+        <p:cNvPr id="1" name=""/>
+        <p:cNvGrpSpPr/>
+        <p:nvPr/>
+      </p:nvGrpSpPr>
+      <p:grpSpPr>
+        <a:xfrm>
+          <a:off x="0" y="0"/>
+          <a:ext cx="0" cy="0"/>
+          <a:chOff x="0" y="0"/>
+          <a:chExt cx="0" cy="0"/>
+        </a:xfrm>
+      </p:grpSpPr>
+      <p:sp>
+        <p:nvSpPr>
+          <p:cNvPr id="4" name="Titel 1">
+            <a:extLst>
+              <a:ext uri="{FF2B5EF4-FFF2-40B4-BE49-F238E27FC236}">
+                <a16:creationId xmlns:a16="http://schemas.microsoft.com/office/drawing/2014/main" id="{E52AEF54-0576-4AF3-ACD1-880621926224}"/>
+              </a:ext>
+            </a:extLst>
+          </p:cNvPr>
+          <p:cNvSpPr>
+            <a:spLocks noGrp="1"/>
+          </p:cNvSpPr>
+          <p:nvPr>
+            <p:ph type="title"/>
+          </p:nvPr>
+        </p:nvSpPr>
+        <p:spPr>
+          <a:xfrm>
+            <a:off x="838200" y="365125"/>
+            <a:ext cx="10515600" cy="1325563"/>
+          </a:xfrm>
+        </p:spPr>
+        <p:txBody>
+          <a:bodyPr/>
+          <a:lstStyle/>
+          <a:p>
+            <a:r>
+              <a:rPr lang="en-US">
+                <a:latin typeface="+mj-lt"/>
+              </a:rPr>
+              <a:t>Example map</a:t>
+            </a:r>
+            <a:endParaRPr lang="en-US" dirty="0">
+              <a:latin typeface="+mj-lt"/>
+            </a:endParaRPr>
+          </a:p>
+        </p:txBody>
+      </p:sp>
+      <p:pic>
+        <p:nvPicPr>
+          <p:cNvPr id="6" name="Picture 2" descr="https://i.gyazo.com/ea7a40a23703c1a754da43535c18079c.png">
+            <a:extLst>
+              <a:ext uri="{FF2B5EF4-FFF2-40B4-BE49-F238E27FC236}">
+                <a16:creationId xmlns:a16="http://schemas.microsoft.com/office/drawing/2014/main" id="{595DB5E8-F465-4A8F-9DE1-E999B09418C8}"/>
+              </a:ext>
+            </a:extLst>
+          </p:cNvPr>
+          <p:cNvPicPr>
+            <a:picLocks noChangeAspect="1" noChangeArrowheads="1"/>
+          </p:cNvPicPr>
+          <p:nvPr/>
+        </p:nvPicPr>
+        <p:blipFill>
+          <a:blip r:embed="rId2">
+            <a:extLst>
+              <a:ext uri="{28A0092B-C50C-407E-A947-70E740481C1C}">
+                <a14:useLocalDpi xmlns:a14="http://schemas.microsoft.com/office/drawing/2010/main" val="0"/>
+              </a:ext>
+            </a:extLst>
+          </a:blip>
+          <a:srcRect/>
+          <a:stretch>
+            <a:fillRect/>
+          </a:stretch>
+        </p:blipFill>
+        <p:spPr bwMode="auto">
+          <a:xfrm>
+            <a:off x="1182511" y="2260518"/>
+            <a:ext cx="4098319" cy="2346489"/>
+          </a:xfrm>
+          <a:prstGeom prst="rect">
+            <a:avLst/>
+          </a:prstGeom>
+          <a:noFill/>
+          <a:extLst>
+            <a:ext uri="{909E8E84-426E-40DD-AFC4-6F175D3DCCD1}">
+              <a14:hiddenFill xmlns:a14="http://schemas.microsoft.com/office/drawing/2010/main">
+                <a:solidFill>
+                  <a:srgbClr val="FFFFFF"/>
+                </a:solidFill>
+              </a14:hiddenFill>
+            </a:ext>
+          </a:extLst>
+        </p:spPr>
+      </p:pic>
+      <p:pic>
+        <p:nvPicPr>
+          <p:cNvPr id="3074" name="Picture 2" descr="https://i.gyazo.com/a8a3d840c702601b0d6ef97e28038d80.png">
+            <a:extLst>
+              <a:ext uri="{FF2B5EF4-FFF2-40B4-BE49-F238E27FC236}">
+                <a16:creationId xmlns:a16="http://schemas.microsoft.com/office/drawing/2014/main" id="{7A45D48A-F679-41BF-B3FC-5A247CD8C9CD}"/>
+              </a:ext>
+            </a:extLst>
+          </p:cNvPr>
+          <p:cNvPicPr>
+            <a:picLocks noChangeAspect="1" noChangeArrowheads="1"/>
+          </p:cNvPicPr>
+          <p:nvPr/>
+        </p:nvPicPr>
+        <p:blipFill>
+          <a:blip r:embed="rId3">
+            <a:extLst>
+              <a:ext uri="{28A0092B-C50C-407E-A947-70E740481C1C}">
+                <a14:useLocalDpi xmlns:a14="http://schemas.microsoft.com/office/drawing/2010/main" val="0"/>
+              </a:ext>
+            </a:extLst>
+          </a:blip>
+          <a:srcRect/>
+          <a:stretch>
+            <a:fillRect/>
+          </a:stretch>
+        </p:blipFill>
+        <p:spPr bwMode="auto">
+          <a:xfrm>
+            <a:off x="6504164" y="1847850"/>
+            <a:ext cx="4505325" cy="3486150"/>
+          </a:xfrm>
+          <a:prstGeom prst="rect">
+            <a:avLst/>
+          </a:prstGeom>
+          <a:noFill/>
+          <a:extLst>
+            <a:ext uri="{909E8E84-426E-40DD-AFC4-6F175D3DCCD1}">
+              <a14:hiddenFill xmlns:a14="http://schemas.microsoft.com/office/drawing/2010/main">
+                <a:solidFill>
+                  <a:srgbClr val="FFFFFF"/>
+                </a:solidFill>
+              </a14:hiddenFill>
+            </a:ext>
+          </a:extLst>
+        </p:spPr>
+      </p:pic>
+    </p:spTree>
+    <p:extLst>
+      <p:ext uri="{BB962C8B-B14F-4D97-AF65-F5344CB8AC3E}">
+        <p14:creationId xmlns:p14="http://schemas.microsoft.com/office/powerpoint/2010/main" val="2784808938"/>
+      </p:ext>
+    </p:extLst>
+  </p:cSld>
+  <p:clrMapOvr>
+    <a:masterClrMapping/>
+  </p:clrMapOvr>
+</p:sld>
+</file>
+
+<file path=ppt/slides/slide15.xml><?xml version="1.0" encoding="utf-8"?>
+<p:sld xmlns:a="http://schemas.openxmlformats.org/drawingml/2006/main" xmlns:r="http://schemas.openxmlformats.org/officeDocument/2006/relationships" xmlns:p="http://schemas.openxmlformats.org/presentationml/2006/main">
+  <p:cSld>
+    <p:spTree>
+      <p:nvGrpSpPr>
+        <p:cNvPr id="1" name=""/>
+        <p:cNvGrpSpPr/>
+        <p:nvPr/>
+      </p:nvGrpSpPr>
+      <p:grpSpPr>
+        <a:xfrm>
+          <a:off x="0" y="0"/>
+          <a:ext cx="0" cy="0"/>
+          <a:chOff x="0" y="0"/>
+          <a:chExt cx="0" cy="0"/>
+        </a:xfrm>
+      </p:grpSpPr>
+      <p:sp>
+        <p:nvSpPr>
+          <p:cNvPr id="4" name="Titel 1">
+            <a:extLst>
+              <a:ext uri="{FF2B5EF4-FFF2-40B4-BE49-F238E27FC236}">
+                <a16:creationId xmlns:a16="http://schemas.microsoft.com/office/drawing/2014/main" id="{E52AEF54-0576-4AF3-ACD1-880621926224}"/>
+              </a:ext>
+            </a:extLst>
+          </p:cNvPr>
+          <p:cNvSpPr>
+            <a:spLocks noGrp="1"/>
+          </p:cNvSpPr>
+          <p:nvPr>
+            <p:ph type="title"/>
+          </p:nvPr>
+        </p:nvSpPr>
+        <p:spPr>
+          <a:xfrm>
+            <a:off x="838200" y="365125"/>
+            <a:ext cx="10515600" cy="1325563"/>
+          </a:xfrm>
+        </p:spPr>
+        <p:txBody>
+          <a:bodyPr/>
+          <a:lstStyle/>
+          <a:p>
+            <a:r>
+              <a:rPr lang="en-US">
+                <a:latin typeface="+mj-lt"/>
+              </a:rPr>
+              <a:t>Example map</a:t>
+            </a:r>
+            <a:endParaRPr lang="en-US" dirty="0">
+              <a:latin typeface="+mj-lt"/>
+            </a:endParaRPr>
+          </a:p>
+        </p:txBody>
+      </p:sp>
+      <p:pic>
+        <p:nvPicPr>
+          <p:cNvPr id="3074" name="Picture 2" descr="https://i.gyazo.com/a8a3d840c702601b0d6ef97e28038d80.png">
+            <a:extLst>
+              <a:ext uri="{FF2B5EF4-FFF2-40B4-BE49-F238E27FC236}">
+                <a16:creationId xmlns:a16="http://schemas.microsoft.com/office/drawing/2014/main" id="{7A45D48A-F679-41BF-B3FC-5A247CD8C9CD}"/>
+              </a:ext>
+            </a:extLst>
+          </p:cNvPr>
+          <p:cNvPicPr>
+            <a:picLocks noChangeAspect="1" noChangeArrowheads="1"/>
+          </p:cNvPicPr>
+          <p:nvPr/>
+        </p:nvPicPr>
+        <p:blipFill>
+          <a:blip r:embed="rId2">
+            <a:extLst>
+              <a:ext uri="{28A0092B-C50C-407E-A947-70E740481C1C}">
+                <a14:useLocalDpi xmlns:a14="http://schemas.microsoft.com/office/drawing/2010/main" val="0"/>
+              </a:ext>
+            </a:extLst>
+          </a:blip>
+          <a:srcRect/>
+          <a:stretch>
+            <a:fillRect/>
+          </a:stretch>
+        </p:blipFill>
+        <p:spPr bwMode="auto">
+          <a:xfrm>
+            <a:off x="6504164" y="1847850"/>
+            <a:ext cx="4505325" cy="3486150"/>
+          </a:xfrm>
+          <a:prstGeom prst="rect">
+            <a:avLst/>
+          </a:prstGeom>
+          <a:noFill/>
+          <a:extLst>
+            <a:ext uri="{909E8E84-426E-40DD-AFC4-6F175D3DCCD1}">
+              <a14:hiddenFill xmlns:a14="http://schemas.microsoft.com/office/drawing/2010/main">
+                <a:solidFill>
+                  <a:srgbClr val="FFFFFF"/>
+                </a:solidFill>
+              </a14:hiddenFill>
+            </a:ext>
+          </a:extLst>
+        </p:spPr>
+      </p:pic>
+      <p:pic>
+        <p:nvPicPr>
+          <p:cNvPr id="5" name="Picture 4" descr="https://i.gyazo.com/fa6f98aaf742aaac56a1900a24d27afb.png">
+            <a:extLst>
+              <a:ext uri="{FF2B5EF4-FFF2-40B4-BE49-F238E27FC236}">
+                <a16:creationId xmlns:a16="http://schemas.microsoft.com/office/drawing/2014/main" id="{443F974B-4A12-47A4-A5EE-3A7F23CFD2C5}"/>
+              </a:ext>
+            </a:extLst>
+          </p:cNvPr>
+          <p:cNvPicPr>
+            <a:picLocks noChangeAspect="1" noChangeArrowheads="1"/>
+          </p:cNvPicPr>
+          <p:nvPr/>
+        </p:nvPicPr>
+        <p:blipFill>
+          <a:blip r:embed="rId3">
+            <a:extLst>
+              <a:ext uri="{28A0092B-C50C-407E-A947-70E740481C1C}">
+                <a14:useLocalDpi xmlns:a14="http://schemas.microsoft.com/office/drawing/2010/main" val="0"/>
+              </a:ext>
+            </a:extLst>
+          </a:blip>
+          <a:srcRect/>
+          <a:stretch>
+            <a:fillRect/>
+          </a:stretch>
+        </p:blipFill>
+        <p:spPr bwMode="auto">
+          <a:xfrm>
+            <a:off x="933450" y="2505075"/>
+            <a:ext cx="5162550" cy="1847850"/>
+          </a:xfrm>
+          <a:prstGeom prst="rect">
+            <a:avLst/>
+          </a:prstGeom>
+          <a:noFill/>
+          <a:extLst>
+            <a:ext uri="{909E8E84-426E-40DD-AFC4-6F175D3DCCD1}">
+              <a14:hiddenFill xmlns:a14="http://schemas.microsoft.com/office/drawing/2010/main">
+                <a:solidFill>
+                  <a:srgbClr val="FFFFFF"/>
+                </a:solidFill>
+              </a14:hiddenFill>
+            </a:ext>
+          </a:extLst>
+        </p:spPr>
+      </p:pic>
+    </p:spTree>
+    <p:extLst>
+      <p:ext uri="{BB962C8B-B14F-4D97-AF65-F5344CB8AC3E}">
+        <p14:creationId xmlns:p14="http://schemas.microsoft.com/office/powerpoint/2010/main" val="3951585190"/>
+      </p:ext>
+    </p:extLst>
+  </p:cSld>
+  <p:clrMapOvr>
+    <a:masterClrMapping/>
+  </p:clrMapOvr>
+</p:sld>
+</file>
+
+<file path=ppt/slides/slide16.xml><?xml version="1.0" encoding="utf-8"?>
 <p:sld xmlns:a="http://schemas.openxmlformats.org/drawingml/2006/main" xmlns:r="http://schemas.openxmlformats.org/officeDocument/2006/relationships" xmlns:p="http://schemas.openxmlformats.org/presentationml/2006/main">
   <p:cSld>
     <p:spTree>
@@ -4251,7 +4898,7 @@
           <a:p>
             <a:r>
               <a:rPr lang="en-US" dirty="0"/>
-              <a:t>Talked about what you want to see in these lessons</a:t>
+              <a:t>Introduction to Map</a:t>
             </a:r>
           </a:p>
         </p:txBody>

</xml_diff>